<commit_message>
todos rodados, comecar relatorio
</commit_message>
<xml_diff>
--- a/GA/Trabalho2/Relatorio/Imagens/imagens.pptx
+++ b/GA/Trabalho2/Relatorio/Imagens/imagens.pptx
@@ -2773,8 +2773,8 @@
         </p:nvSpPr>
         <p:spPr>
           <a:xfrm>
-            <a:off x="1523880" y="1122480"/>
-            <a:ext cx="9143280" cy="2386800"/>
+            <a:off x="609480" y="273600"/>
+            <a:ext cx="10972080" cy="1144440"/>
           </a:xfrm>
           <a:prstGeom prst="rect">
             <a:avLst/>
@@ -2789,13 +2789,7 @@
               <a:rPr b="0" lang="pt-BR" sz="1800" spc="-1" strike="noStrike">
                 <a:latin typeface="Arial"/>
               </a:rPr>
-              <a:t>Click to edit the title text </a:t>
-            </a:r>
-            <a:r>
-              <a:rPr b="0" lang="pt-BR" sz="1800" spc="-1" strike="noStrike">
-                <a:latin typeface="Arial"/>
-              </a:rPr>
-              <a:t>format</a:t>
+              <a:t>Click to edit the title text format</a:t>
             </a:r>
             <a:endParaRPr b="0" lang="pt-BR" sz="1800" spc="-1" strike="noStrike">
               <a:latin typeface="Arial"/>
@@ -2816,7 +2810,7 @@
         <p:spPr>
           <a:xfrm>
             <a:off x="609480" y="1604520"/>
-            <a:ext cx="10972440" cy="3977280"/>
+            <a:ext cx="10972080" cy="3976920"/>
           </a:xfrm>
           <a:prstGeom prst="rect">
             <a:avLst/>
@@ -2839,12 +2833,12 @@
               <a:buChar char=""/>
             </a:pPr>
             <a:r>
-              <a:rPr b="0" lang="pt-BR" sz="3200" spc="-1" strike="noStrike">
+              <a:rPr b="0" lang="pt-BR" sz="1800" spc="-1" strike="noStrike">
                 <a:latin typeface="Arial"/>
               </a:rPr>
               <a:t>Click to edit the outline text format</a:t>
             </a:r>
-            <a:endParaRPr b="0" lang="pt-BR" sz="3200" spc="-1" strike="noStrike">
+            <a:endParaRPr b="0" lang="pt-BR" sz="1800" spc="-1" strike="noStrike">
               <a:latin typeface="Arial"/>
             </a:endParaRPr>
           </a:p>
@@ -2861,12 +2855,12 @@
               <a:buChar char=""/>
             </a:pPr>
             <a:r>
-              <a:rPr b="0" lang="pt-BR" sz="2800" spc="-1" strike="noStrike">
+              <a:rPr b="0" lang="pt-BR" sz="1800" spc="-1" strike="noStrike">
                 <a:latin typeface="Arial"/>
               </a:rPr>
               <a:t>Second Outline Level</a:t>
             </a:r>
-            <a:endParaRPr b="0" lang="pt-BR" sz="2800" spc="-1" strike="noStrike">
+            <a:endParaRPr b="0" lang="pt-BR" sz="1800" spc="-1" strike="noStrike">
               <a:latin typeface="Arial"/>
             </a:endParaRPr>
           </a:p>
@@ -2883,12 +2877,12 @@
               <a:buChar char=""/>
             </a:pPr>
             <a:r>
-              <a:rPr b="0" lang="pt-BR" sz="2400" spc="-1" strike="noStrike">
+              <a:rPr b="0" lang="pt-BR" sz="1800" spc="-1" strike="noStrike">
                 <a:latin typeface="Arial"/>
               </a:rPr>
               <a:t>Third Outline Level</a:t>
             </a:r>
-            <a:endParaRPr b="0" lang="pt-BR" sz="2400" spc="-1" strike="noStrike">
+            <a:endParaRPr b="0" lang="pt-BR" sz="1800" spc="-1" strike="noStrike">
               <a:latin typeface="Arial"/>
             </a:endParaRPr>
           </a:p>
@@ -2905,12 +2899,12 @@
               <a:buChar char=""/>
             </a:pPr>
             <a:r>
-              <a:rPr b="0" lang="pt-BR" sz="2000" spc="-1" strike="noStrike">
+              <a:rPr b="0" lang="pt-BR" sz="1800" spc="-1" strike="noStrike">
                 <a:latin typeface="Arial"/>
               </a:rPr>
               <a:t>Fourth Outline Level</a:t>
             </a:r>
-            <a:endParaRPr b="0" lang="pt-BR" sz="2000" spc="-1" strike="noStrike">
+            <a:endParaRPr b="0" lang="pt-BR" sz="1800" spc="-1" strike="noStrike">
               <a:latin typeface="Arial"/>
             </a:endParaRPr>
           </a:p>
@@ -2927,12 +2921,12 @@
               <a:buChar char=""/>
             </a:pPr>
             <a:r>
-              <a:rPr b="0" lang="pt-BR" sz="2000" spc="-1" strike="noStrike">
+              <a:rPr b="0" lang="pt-BR" sz="1800" spc="-1" strike="noStrike">
                 <a:latin typeface="Arial"/>
               </a:rPr>
               <a:t>Fifth Outline Level</a:t>
             </a:r>
-            <a:endParaRPr b="0" lang="pt-BR" sz="2000" spc="-1" strike="noStrike">
+            <a:endParaRPr b="0" lang="pt-BR" sz="1800" spc="-1" strike="noStrike">
               <a:latin typeface="Arial"/>
             </a:endParaRPr>
           </a:p>
@@ -2949,12 +2943,12 @@
               <a:buChar char=""/>
             </a:pPr>
             <a:r>
-              <a:rPr b="0" lang="pt-BR" sz="2000" spc="-1" strike="noStrike">
+              <a:rPr b="0" lang="pt-BR" sz="1800" spc="-1" strike="noStrike">
                 <a:latin typeface="Arial"/>
               </a:rPr>
               <a:t>Sixth Outline Level</a:t>
             </a:r>
-            <a:endParaRPr b="0" lang="pt-BR" sz="2000" spc="-1" strike="noStrike">
+            <a:endParaRPr b="0" lang="pt-BR" sz="1800" spc="-1" strike="noStrike">
               <a:latin typeface="Arial"/>
             </a:endParaRPr>
           </a:p>
@@ -2971,12 +2965,12 @@
               <a:buChar char=""/>
             </a:pPr>
             <a:r>
-              <a:rPr b="0" lang="pt-BR" sz="2000" spc="-1" strike="noStrike">
+              <a:rPr b="0" lang="pt-BR" sz="1800" spc="-1" strike="noStrike">
                 <a:latin typeface="Arial"/>
               </a:rPr>
               <a:t>Seventh Outline Level</a:t>
             </a:r>
-            <a:endParaRPr b="0" lang="pt-BR" sz="2000" spc="-1" strike="noStrike">
+            <a:endParaRPr b="0" lang="pt-BR" sz="1800" spc="-1" strike="noStrike">
               <a:latin typeface="Arial"/>
             </a:endParaRPr>
           </a:p>
@@ -3055,19 +3049,7 @@
               <a:rPr b="0" lang="pt-BR" sz="4400" spc="-1" strike="noStrike">
                 <a:latin typeface="Arial"/>
               </a:rPr>
-              <a:t>Click to edit </a:t>
-            </a:r>
-            <a:r>
-              <a:rPr b="0" lang="pt-BR" sz="4400" spc="-1" strike="noStrike">
-                <a:latin typeface="Arial"/>
-              </a:rPr>
-              <a:t>the title text </a:t>
-            </a:r>
-            <a:r>
-              <a:rPr b="0" lang="pt-BR" sz="4400" spc="-1" strike="noStrike">
-                <a:latin typeface="Arial"/>
-              </a:rPr>
-              <a:t>format</a:t>
+              <a:t>Click to edit the title text format</a:t>
             </a:r>
             <a:endParaRPr b="0" lang="pt-BR" sz="4400" spc="-1" strike="noStrike">
               <a:latin typeface="Arial"/>
@@ -3300,7 +3282,7 @@
         <p:spPr>
           <a:xfrm>
             <a:off x="246240" y="144000"/>
-            <a:ext cx="2818440" cy="601920"/>
+            <a:ext cx="2818080" cy="601560"/>
           </a:xfrm>
           <a:prstGeom prst="rect">
             <a:avLst/>
@@ -3328,7 +3310,11 @@
             </a:pPr>
             <a:r>
               <a:rPr b="0" lang="pt-BR" sz="1800" spc="-1" strike="noStrike">
+                <a:solidFill>
+                  <a:srgbClr val="000000"/>
+                </a:solidFill>
                 <a:latin typeface="Arial"/>
+                <a:ea typeface="DejaVu Sans"/>
               </a:rPr>
               <a:t>Max num iterarions 10 50 </a:t>
             </a:r>
@@ -3344,31 +3330,51 @@
             </a:pPr>
             <a:r>
               <a:rPr b="0" lang="pt-BR" sz="1800" spc="-1" strike="noStrike">
+                <a:solidFill>
+                  <a:srgbClr val="000000"/>
+                </a:solidFill>
                 <a:latin typeface="Arial"/>
+                <a:ea typeface="DejaVu Sans"/>
               </a:rPr>
               <a:t>	</a:t>
             </a:r>
             <a:r>
               <a:rPr b="0" lang="pt-BR" sz="1800" spc="-1" strike="noStrike">
+                <a:solidFill>
+                  <a:srgbClr val="000000"/>
+                </a:solidFill>
                 <a:latin typeface="Arial"/>
+                <a:ea typeface="DejaVu Sans"/>
               </a:rPr>
               <a:t>	</a:t>
             </a:r>
             <a:r>
               <a:rPr b="0" lang="pt-BR" sz="1800" spc="-1" strike="noStrike">
+                <a:solidFill>
+                  <a:srgbClr val="000000"/>
+                </a:solidFill>
                 <a:latin typeface="Arial"/>
+                <a:ea typeface="DejaVu Sans"/>
               </a:rPr>
               <a:t>	</a:t>
             </a:r>
             <a:r>
               <a:rPr b="0" lang="pt-BR" sz="1800" spc="-1" strike="noStrike">
+                <a:solidFill>
+                  <a:srgbClr val="000000"/>
+                </a:solidFill>
                 <a:latin typeface="Arial"/>
+                <a:ea typeface="DejaVu Sans"/>
               </a:rPr>
               <a:t>	</a:t>
             </a:r>
             <a:r>
               <a:rPr b="0" lang="pt-BR" sz="1800" spc="-1" strike="noStrike">
+                <a:solidFill>
+                  <a:srgbClr val="000000"/>
+                </a:solidFill>
                 <a:latin typeface="Arial"/>
+                <a:ea typeface="DejaVu Sans"/>
               </a:rPr>
               <a:t>200 500</a:t>
             </a:r>
@@ -3391,7 +3397,7 @@
         <p:spPr>
           <a:xfrm>
             <a:off x="864000" y="720000"/>
-            <a:ext cx="4613400" cy="3359520"/>
+            <a:ext cx="4613040" cy="3359160"/>
           </a:xfrm>
           <a:prstGeom prst="rect">
             <a:avLst/>
@@ -3414,7 +3420,7 @@
         <p:spPr>
           <a:xfrm>
             <a:off x="5477760" y="720000"/>
-            <a:ext cx="4613400" cy="3359520"/>
+            <a:ext cx="4613040" cy="3359160"/>
           </a:xfrm>
           <a:prstGeom prst="rect">
             <a:avLst/>
@@ -3437,7 +3443,7 @@
         <p:spPr>
           <a:xfrm>
             <a:off x="864000" y="4007880"/>
-            <a:ext cx="4613400" cy="3359520"/>
+            <a:ext cx="4613040" cy="3359160"/>
           </a:xfrm>
           <a:prstGeom prst="rect">
             <a:avLst/>
@@ -3460,7 +3466,7 @@
         <p:spPr>
           <a:xfrm>
             <a:off x="5477760" y="3960000"/>
-            <a:ext cx="4613400" cy="3359520"/>
+            <a:ext cx="4613040" cy="3359160"/>
           </a:xfrm>
           <a:prstGeom prst="rect">
             <a:avLst/>
@@ -3502,14 +3508,14 @@
       </p:grpSpPr>
       <p:sp>
         <p:nvSpPr>
-          <p:cNvPr id="119" name="TextShape 1"/>
-          <p:cNvSpPr txBox="1"/>
+          <p:cNvPr id="119" name="CustomShape 1"/>
+          <p:cNvSpPr/>
           <p:nvPr/>
         </p:nvSpPr>
         <p:spPr>
           <a:xfrm>
             <a:off x="138240" y="216000"/>
-            <a:ext cx="1157760" cy="346320"/>
+            <a:ext cx="1157400" cy="345960"/>
           </a:xfrm>
           <a:prstGeom prst="rect">
             <a:avLst/>
@@ -3519,11 +3525,22 @@
             <a:noFill/>
           </a:ln>
         </p:spPr>
+        <p:style>
+          <a:lnRef idx="0"/>
+          <a:fillRef idx="0"/>
+          <a:effectRef idx="0"/>
+          <a:fontRef idx="minor"/>
+        </p:style>
         <p:txBody>
           <a:bodyPr lIns="90000" rIns="90000" tIns="45000" bIns="45000">
             <a:noAutofit/>
           </a:bodyPr>
           <a:p>
+            <a:pPr>
+              <a:lnSpc>
+                <a:spcPct val="100000"/>
+              </a:lnSpc>
+            </a:pPr>
             <a:r>
               <a:rPr b="0" lang="pt-BR" sz="1800" spc="-1" strike="noStrike">
                 <a:latin typeface="Arial"/>
@@ -3549,7 +3566,7 @@
         <p:spPr>
           <a:xfrm>
             <a:off x="9066240" y="1368000"/>
-            <a:ext cx="4613760" cy="3359880"/>
+            <a:ext cx="4613400" cy="3359520"/>
           </a:xfrm>
           <a:prstGeom prst="rect">
             <a:avLst/>
@@ -3572,7 +3589,7 @@
         <p:spPr>
           <a:xfrm>
             <a:off x="79920" y="1440000"/>
-            <a:ext cx="4600080" cy="3352320"/>
+            <a:ext cx="4599720" cy="3351960"/>
           </a:xfrm>
           <a:prstGeom prst="rect">
             <a:avLst/>
@@ -3595,7 +3612,7 @@
         <p:spPr>
           <a:xfrm>
             <a:off x="4615920" y="1440000"/>
-            <a:ext cx="4600080" cy="3352320"/>
+            <a:ext cx="4599720" cy="3351960"/>
           </a:xfrm>
           <a:prstGeom prst="rect">
             <a:avLst/>
@@ -3637,14 +3654,14 @@
       </p:grpSpPr>
       <p:sp>
         <p:nvSpPr>
-          <p:cNvPr id="123" name="TextShape 1"/>
-          <p:cNvSpPr txBox="1"/>
+          <p:cNvPr id="123" name="CustomShape 1"/>
+          <p:cNvSpPr/>
           <p:nvPr/>
         </p:nvSpPr>
         <p:spPr>
           <a:xfrm>
             <a:off x="138240" y="216000"/>
-            <a:ext cx="1157760" cy="346320"/>
+            <a:ext cx="1157400" cy="345960"/>
           </a:xfrm>
           <a:prstGeom prst="rect">
             <a:avLst/>
@@ -3654,11 +3671,22 @@
             <a:noFill/>
           </a:ln>
         </p:spPr>
+        <p:style>
+          <a:lnRef idx="0"/>
+          <a:fillRef idx="0"/>
+          <a:effectRef idx="0"/>
+          <a:fontRef idx="minor"/>
+        </p:style>
         <p:txBody>
           <a:bodyPr lIns="90000" rIns="90000" tIns="45000" bIns="45000">
             <a:noAutofit/>
           </a:bodyPr>
           <a:p>
+            <a:pPr>
+              <a:lnSpc>
+                <a:spcPct val="100000"/>
+              </a:lnSpc>
+            </a:pPr>
             <a:r>
               <a:rPr b="0" lang="pt-BR" sz="1800" spc="-1" strike="noStrike">
                 <a:latin typeface="Arial"/>
@@ -3684,7 +3712,7 @@
         <p:spPr>
           <a:xfrm>
             <a:off x="7855920" y="1796400"/>
-            <a:ext cx="4600080" cy="3171600"/>
+            <a:ext cx="4599720" cy="3171240"/>
           </a:xfrm>
           <a:prstGeom prst="rect">
             <a:avLst/>
@@ -3707,7 +3735,7 @@
         <p:spPr>
           <a:xfrm>
             <a:off x="-1576080" y="1887480"/>
-            <a:ext cx="4600080" cy="3152520"/>
+            <a:ext cx="4599720" cy="3152160"/>
           </a:xfrm>
           <a:prstGeom prst="rect">
             <a:avLst/>
@@ -3730,7 +3758,7 @@
         <p:spPr>
           <a:xfrm>
             <a:off x="3168000" y="1872000"/>
-            <a:ext cx="4600080" cy="3190680"/>
+            <a:ext cx="4599720" cy="3190320"/>
           </a:xfrm>
           <a:prstGeom prst="rect">
             <a:avLst/>
@@ -3778,8 +3806,8 @@
         </p:nvSpPr>
         <p:spPr>
           <a:xfrm>
-            <a:off x="138240" y="216000"/>
-            <a:ext cx="1157760" cy="346320"/>
+            <a:off x="144000" y="157680"/>
+            <a:ext cx="1727640" cy="346320"/>
           </a:xfrm>
           <a:prstGeom prst="rect">
             <a:avLst/>
@@ -3798,7 +3826,7 @@
               <a:rPr b="0" lang="pt-BR" sz="1800" spc="-1" strike="noStrike">
                 <a:latin typeface="Arial"/>
               </a:rPr>
-              <a:t>taxacross</a:t>
+              <a:t>Parents portion</a:t>
             </a:r>
             <a:endParaRPr b="0" lang="pt-BR" sz="1800" spc="-1" strike="noStrike">
               <a:latin typeface="Arial"/>
@@ -3818,8 +3846,8 @@
         </p:blipFill>
         <p:spPr>
           <a:xfrm>
-            <a:off x="9066240" y="1368000"/>
-            <a:ext cx="4613760" cy="3359880"/>
+            <a:off x="1172160" y="3631680"/>
+            <a:ext cx="4723920" cy="3352320"/>
           </a:xfrm>
           <a:prstGeom prst="rect">
             <a:avLst/>
@@ -3841,7 +3869,7 @@
         </p:blipFill>
         <p:spPr>
           <a:xfrm>
-            <a:off x="79920" y="1440000"/>
+            <a:off x="6271920" y="319680"/>
             <a:ext cx="4600080" cy="3352320"/>
           </a:xfrm>
           <a:prstGeom prst="rect">
@@ -3864,7 +3892,30 @@
         </p:blipFill>
         <p:spPr>
           <a:xfrm>
-            <a:off x="4615920" y="1440000"/>
+            <a:off x="1296000" y="319680"/>
+            <a:ext cx="4600080" cy="3352320"/>
+          </a:xfrm>
+          <a:prstGeom prst="rect">
+            <a:avLst/>
+          </a:prstGeom>
+          <a:ln>
+            <a:noFill/>
+          </a:ln>
+        </p:spPr>
+      </p:pic>
+      <p:pic>
+        <p:nvPicPr>
+          <p:cNvPr id="131" name="" descr=""/>
+          <p:cNvPicPr/>
+          <p:nvPr/>
+        </p:nvPicPr>
+        <p:blipFill>
+          <a:blip r:embed="rId4"/>
+          <a:stretch/>
+        </p:blipFill>
+        <p:spPr>
+          <a:xfrm>
+            <a:off x="6271920" y="3559680"/>
             <a:ext cx="4600080" cy="3352320"/>
           </a:xfrm>
           <a:prstGeom prst="rect">
@@ -3907,14 +3958,14 @@
       </p:grpSpPr>
       <p:sp>
         <p:nvSpPr>
-          <p:cNvPr id="131" name="TextShape 1"/>
+          <p:cNvPr id="132" name="TextShape 1"/>
           <p:cNvSpPr txBox="1"/>
           <p:nvPr/>
         </p:nvSpPr>
         <p:spPr>
           <a:xfrm>
-            <a:off x="138240" y="216000"/>
-            <a:ext cx="1157760" cy="346320"/>
+            <a:off x="144000" y="157680"/>
+            <a:ext cx="1727640" cy="346320"/>
           </a:xfrm>
           <a:prstGeom prst="rect">
             <a:avLst/>
@@ -3933,7 +3984,7 @@
               <a:rPr b="0" lang="pt-BR" sz="1800" spc="-1" strike="noStrike">
                 <a:latin typeface="Arial"/>
               </a:rPr>
-              <a:t>taxacross</a:t>
+              <a:t>Parents portion</a:t>
             </a:r>
             <a:endParaRPr b="0" lang="pt-BR" sz="1800" spc="-1" strike="noStrike">
               <a:latin typeface="Arial"/>
@@ -3943,7 +3994,7 @@
       </p:sp>
       <p:pic>
         <p:nvPicPr>
-          <p:cNvPr id="132" name="" descr=""/>
+          <p:cNvPr id="133" name="" descr=""/>
           <p:cNvPicPr/>
           <p:nvPr/>
         </p:nvPicPr>
@@ -3953,8 +4004,8 @@
         </p:blipFill>
         <p:spPr>
           <a:xfrm>
-            <a:off x="9066240" y="1368000"/>
-            <a:ext cx="4613760" cy="3359880"/>
+            <a:off x="6076080" y="3543480"/>
+            <a:ext cx="4723920" cy="3152520"/>
           </a:xfrm>
           <a:prstGeom prst="rect">
             <a:avLst/>
@@ -3966,7 +4017,7 @@
       </p:pic>
       <p:pic>
         <p:nvPicPr>
-          <p:cNvPr id="133" name="" descr=""/>
+          <p:cNvPr id="134" name="" descr=""/>
           <p:cNvPicPr/>
           <p:nvPr/>
         </p:nvPicPr>
@@ -3976,8 +4027,8 @@
         </p:blipFill>
         <p:spPr>
           <a:xfrm>
-            <a:off x="79920" y="1440000"/>
-            <a:ext cx="4600080" cy="3352320"/>
+            <a:off x="6076080" y="390960"/>
+            <a:ext cx="4600080" cy="3152520"/>
           </a:xfrm>
           <a:prstGeom prst="rect">
             <a:avLst/>
@@ -3989,7 +4040,7 @@
       </p:pic>
       <p:pic>
         <p:nvPicPr>
-          <p:cNvPr id="134" name="" descr=""/>
+          <p:cNvPr id="135" name="" descr=""/>
           <p:cNvPicPr/>
           <p:nvPr/>
         </p:nvPicPr>
@@ -3999,8 +4050,31 @@
         </p:blipFill>
         <p:spPr>
           <a:xfrm>
-            <a:off x="4615920" y="1440000"/>
-            <a:ext cx="4600080" cy="3352320"/>
+            <a:off x="1159920" y="360000"/>
+            <a:ext cx="4600080" cy="3152520"/>
+          </a:xfrm>
+          <a:prstGeom prst="rect">
+            <a:avLst/>
+          </a:prstGeom>
+          <a:ln>
+            <a:noFill/>
+          </a:ln>
+        </p:spPr>
+      </p:pic>
+      <p:pic>
+        <p:nvPicPr>
+          <p:cNvPr id="136" name="" descr=""/>
+          <p:cNvPicPr/>
+          <p:nvPr/>
+        </p:nvPicPr>
+        <p:blipFill>
+          <a:blip r:embed="rId4"/>
+          <a:stretch/>
+        </p:blipFill>
+        <p:spPr>
+          <a:xfrm>
+            <a:off x="1296000" y="3615480"/>
+            <a:ext cx="4600080" cy="3152520"/>
           </a:xfrm>
           <a:prstGeom prst="rect">
             <a:avLst/>
@@ -4049,7 +4123,7 @@
         <p:spPr>
           <a:xfrm>
             <a:off x="246240" y="301680"/>
-            <a:ext cx="3641400" cy="345960"/>
+            <a:ext cx="3641040" cy="345600"/>
           </a:xfrm>
           <a:prstGeom prst="rect">
             <a:avLst/>
@@ -4077,7 +4151,11 @@
             </a:pPr>
             <a:r>
               <a:rPr b="0" lang="pt-BR" sz="1800" spc="-1" strike="noStrike">
+                <a:solidFill>
+                  <a:srgbClr val="000000"/>
+                </a:solidFill>
                 <a:latin typeface="Arial"/>
+                <a:ea typeface="DejaVu Sans"/>
               </a:rPr>
               <a:t>Max num iterarions 10 50 200 500</a:t>
             </a:r>
@@ -4100,7 +4178,7 @@
         <p:spPr>
           <a:xfrm>
             <a:off x="132480" y="792000"/>
-            <a:ext cx="4613400" cy="3165120"/>
+            <a:ext cx="4613040" cy="3164760"/>
           </a:xfrm>
           <a:prstGeom prst="rect">
             <a:avLst/>
@@ -4123,7 +4201,7 @@
         <p:spPr>
           <a:xfrm>
             <a:off x="4746240" y="792000"/>
-            <a:ext cx="4613400" cy="3165120"/>
+            <a:ext cx="4613040" cy="3164760"/>
           </a:xfrm>
           <a:prstGeom prst="rect">
             <a:avLst/>
@@ -4146,7 +4224,7 @@
         <p:spPr>
           <a:xfrm>
             <a:off x="72000" y="3962520"/>
-            <a:ext cx="4613400" cy="3165120"/>
+            <a:ext cx="4613040" cy="3164760"/>
           </a:xfrm>
           <a:prstGeom prst="rect">
             <a:avLst/>
@@ -4169,7 +4247,7 @@
         <p:spPr>
           <a:xfrm>
             <a:off x="4818240" y="3888000"/>
-            <a:ext cx="4613400" cy="3165120"/>
+            <a:ext cx="4613040" cy="3164760"/>
           </a:xfrm>
           <a:prstGeom prst="rect">
             <a:avLst/>
@@ -4218,7 +4296,7 @@
         <p:spPr>
           <a:xfrm>
             <a:off x="720000" y="432000"/>
-            <a:ext cx="1725840" cy="345960"/>
+            <a:ext cx="1725480" cy="345600"/>
           </a:xfrm>
           <a:prstGeom prst="rect">
             <a:avLst/>
@@ -4246,7 +4324,11 @@
             </a:pPr>
             <a:r>
               <a:rPr b="0" lang="pt-BR" sz="1800" spc="-1" strike="noStrike">
+                <a:solidFill>
+                  <a:srgbClr val="000000"/>
+                </a:solidFill>
                 <a:latin typeface="Arial"/>
+                <a:ea typeface="DejaVu Sans"/>
               </a:rPr>
               <a:t>Population size</a:t>
             </a:r>
@@ -4269,7 +4351,7 @@
         <p:spPr>
           <a:xfrm>
             <a:off x="288000" y="864000"/>
-            <a:ext cx="4694040" cy="3359520"/>
+            <a:ext cx="4693680" cy="3359160"/>
           </a:xfrm>
           <a:prstGeom prst="rect">
             <a:avLst/>
@@ -4292,7 +4374,7 @@
         <p:spPr>
           <a:xfrm>
             <a:off x="5112000" y="960120"/>
-            <a:ext cx="4613400" cy="3359520"/>
+            <a:ext cx="4613040" cy="3359160"/>
           </a:xfrm>
           <a:prstGeom prst="rect">
             <a:avLst/>
@@ -4315,7 +4397,7 @@
         <p:spPr>
           <a:xfrm>
             <a:off x="377280" y="4320000"/>
-            <a:ext cx="4734360" cy="3359520"/>
+            <a:ext cx="4734000" cy="3359160"/>
           </a:xfrm>
           <a:prstGeom prst="rect">
             <a:avLst/>
@@ -4338,7 +4420,7 @@
         <p:spPr>
           <a:xfrm>
             <a:off x="5273280" y="4416120"/>
-            <a:ext cx="4734360" cy="3359520"/>
+            <a:ext cx="4734000" cy="3359160"/>
           </a:xfrm>
           <a:prstGeom prst="rect">
             <a:avLst/>
@@ -4387,7 +4469,7 @@
         <p:spPr>
           <a:xfrm>
             <a:off x="288000" y="157680"/>
-            <a:ext cx="1725840" cy="345960"/>
+            <a:ext cx="1725480" cy="345600"/>
           </a:xfrm>
           <a:prstGeom prst="rect">
             <a:avLst/>
@@ -4415,7 +4497,11 @@
             </a:pPr>
             <a:r>
               <a:rPr b="0" lang="pt-BR" sz="1800" spc="-1" strike="noStrike">
+                <a:solidFill>
+                  <a:srgbClr val="000000"/>
+                </a:solidFill>
                 <a:latin typeface="Arial"/>
+                <a:ea typeface="DejaVu Sans"/>
               </a:rPr>
               <a:t>Population size</a:t>
             </a:r>
@@ -4438,7 +4524,7 @@
         <p:spPr>
           <a:xfrm>
             <a:off x="705600" y="578520"/>
-            <a:ext cx="4694040" cy="3165120"/>
+            <a:ext cx="4693680" cy="3164760"/>
           </a:xfrm>
           <a:prstGeom prst="rect">
             <a:avLst/>
@@ -4461,7 +4547,7 @@
         <p:spPr>
           <a:xfrm>
             <a:off x="5616000" y="577440"/>
-            <a:ext cx="4613400" cy="3166200"/>
+            <a:ext cx="4613040" cy="3165840"/>
           </a:xfrm>
           <a:prstGeom prst="rect">
             <a:avLst/>
@@ -4484,7 +4570,7 @@
         <p:spPr>
           <a:xfrm>
             <a:off x="593280" y="3692520"/>
-            <a:ext cx="4734360" cy="3165120"/>
+            <a:ext cx="4734000" cy="3164760"/>
           </a:xfrm>
           <a:prstGeom prst="rect">
             <a:avLst/>
@@ -4507,7 +4593,7 @@
         <p:spPr>
           <a:xfrm>
             <a:off x="5400000" y="3600000"/>
-            <a:ext cx="4734360" cy="3185280"/>
+            <a:ext cx="4734000" cy="3184920"/>
           </a:xfrm>
           <a:prstGeom prst="rect">
             <a:avLst/>
@@ -4556,7 +4642,7 @@
         <p:spPr>
           <a:xfrm>
             <a:off x="144000" y="157680"/>
-            <a:ext cx="1055160" cy="345960"/>
+            <a:ext cx="1054800" cy="345600"/>
           </a:xfrm>
           <a:prstGeom prst="rect">
             <a:avLst/>
@@ -4584,7 +4670,11 @@
             </a:pPr>
             <a:r>
               <a:rPr b="0" lang="pt-BR" sz="1800" spc="-1" strike="noStrike">
+                <a:solidFill>
+                  <a:srgbClr val="000000"/>
+                </a:solidFill>
                 <a:latin typeface="Arial"/>
+                <a:ea typeface="DejaVu Sans"/>
               </a:rPr>
               <a:t>mutacao</a:t>
             </a:r>
@@ -4607,7 +4697,7 @@
         <p:spPr>
           <a:xfrm>
             <a:off x="6127920" y="3672000"/>
-            <a:ext cx="4599720" cy="3351960"/>
+            <a:ext cx="4599360" cy="3351600"/>
           </a:xfrm>
           <a:prstGeom prst="rect">
             <a:avLst/>
@@ -4630,7 +4720,7 @@
         <p:spPr>
           <a:xfrm>
             <a:off x="1296000" y="288000"/>
-            <a:ext cx="4613400" cy="3359520"/>
+            <a:ext cx="4613040" cy="3359160"/>
           </a:xfrm>
           <a:prstGeom prst="rect">
             <a:avLst/>
@@ -4653,7 +4743,7 @@
         <p:spPr>
           <a:xfrm>
             <a:off x="5911920" y="288000"/>
-            <a:ext cx="4599720" cy="3351960"/>
+            <a:ext cx="4599360" cy="3351600"/>
           </a:xfrm>
           <a:prstGeom prst="rect">
             <a:avLst/>
@@ -4676,7 +4766,7 @@
         <p:spPr>
           <a:xfrm>
             <a:off x="1309680" y="3703680"/>
-            <a:ext cx="4599720" cy="3351960"/>
+            <a:ext cx="4599360" cy="3351600"/>
           </a:xfrm>
           <a:prstGeom prst="rect">
             <a:avLst/>
@@ -4725,7 +4815,7 @@
         <p:spPr>
           <a:xfrm>
             <a:off x="144000" y="157680"/>
-            <a:ext cx="1055160" cy="345960"/>
+            <a:ext cx="1054800" cy="345600"/>
           </a:xfrm>
           <a:prstGeom prst="rect">
             <a:avLst/>
@@ -4753,7 +4843,11 @@
             </a:pPr>
             <a:r>
               <a:rPr b="0" lang="pt-BR" sz="1800" spc="-1" strike="noStrike">
+                <a:solidFill>
+                  <a:srgbClr val="000000"/>
+                </a:solidFill>
                 <a:latin typeface="Arial"/>
+                <a:ea typeface="DejaVu Sans"/>
               </a:rPr>
               <a:t>mutacao</a:t>
             </a:r>
@@ -4776,7 +4870,7 @@
         <p:spPr>
           <a:xfrm>
             <a:off x="792000" y="3744000"/>
-            <a:ext cx="4599720" cy="3152160"/>
+            <a:ext cx="4599360" cy="3151800"/>
           </a:xfrm>
           <a:prstGeom prst="rect">
             <a:avLst/>
@@ -4799,7 +4893,7 @@
         <p:spPr>
           <a:xfrm>
             <a:off x="864000" y="648000"/>
-            <a:ext cx="4613400" cy="3165120"/>
+            <a:ext cx="4613040" cy="3164760"/>
           </a:xfrm>
           <a:prstGeom prst="rect">
             <a:avLst/>
@@ -4822,7 +4916,7 @@
         <p:spPr>
           <a:xfrm>
             <a:off x="5551920" y="591480"/>
-            <a:ext cx="4599720" cy="3152160"/>
+            <a:ext cx="4599360" cy="3151800"/>
           </a:xfrm>
           <a:prstGeom prst="rect">
             <a:avLst/>
@@ -4845,7 +4939,7 @@
         <p:spPr>
           <a:xfrm>
             <a:off x="5623920" y="3705480"/>
-            <a:ext cx="4599720" cy="3152160"/>
+            <a:ext cx="4599360" cy="3151800"/>
           </a:xfrm>
           <a:prstGeom prst="rect">
             <a:avLst/>
@@ -4887,14 +4981,14 @@
       </p:grpSpPr>
       <p:sp>
         <p:nvSpPr>
-          <p:cNvPr id="106" name="TextShape 1"/>
-          <p:cNvSpPr txBox="1"/>
+          <p:cNvPr id="106" name="CustomShape 1"/>
+          <p:cNvSpPr/>
           <p:nvPr/>
         </p:nvSpPr>
         <p:spPr>
           <a:xfrm>
             <a:off x="288000" y="288000"/>
-            <a:ext cx="1005120" cy="346320"/>
+            <a:ext cx="1004760" cy="345960"/>
           </a:xfrm>
           <a:prstGeom prst="rect">
             <a:avLst/>
@@ -4904,11 +4998,22 @@
             <a:noFill/>
           </a:ln>
         </p:spPr>
+        <p:style>
+          <a:lnRef idx="0"/>
+          <a:fillRef idx="0"/>
+          <a:effectRef idx="0"/>
+          <a:fontRef idx="minor"/>
+        </p:style>
         <p:txBody>
           <a:bodyPr lIns="90000" rIns="90000" tIns="45000" bIns="45000">
             <a:noAutofit/>
           </a:bodyPr>
           <a:p>
+            <a:pPr>
+              <a:lnSpc>
+                <a:spcPct val="100000"/>
+              </a:lnSpc>
+            </a:pPr>
             <a:r>
               <a:rPr b="0" lang="pt-BR" sz="1800" spc="-1" strike="noStrike">
                 <a:latin typeface="Arial"/>
@@ -4934,7 +5039,7 @@
         <p:spPr>
           <a:xfrm>
             <a:off x="-1080000" y="1687680"/>
-            <a:ext cx="4600080" cy="3352320"/>
+            <a:ext cx="4599720" cy="3351960"/>
           </a:xfrm>
           <a:prstGeom prst="rect">
             <a:avLst/>
@@ -4957,7 +5062,7 @@
         <p:spPr>
           <a:xfrm>
             <a:off x="8280000" y="1656000"/>
-            <a:ext cx="4600080" cy="3352320"/>
+            <a:ext cx="4599720" cy="3351960"/>
           </a:xfrm>
           <a:prstGeom prst="rect">
             <a:avLst/>
@@ -4980,7 +5085,7 @@
         <p:spPr>
           <a:xfrm>
             <a:off x="3600000" y="1671840"/>
-            <a:ext cx="4600080" cy="3352320"/>
+            <a:ext cx="4599720" cy="3351960"/>
           </a:xfrm>
           <a:prstGeom prst="rect">
             <a:avLst/>
@@ -5022,14 +5127,14 @@
       </p:grpSpPr>
       <p:sp>
         <p:nvSpPr>
-          <p:cNvPr id="110" name="TextShape 1"/>
-          <p:cNvSpPr txBox="1"/>
+          <p:cNvPr id="110" name="CustomShape 1"/>
+          <p:cNvSpPr/>
           <p:nvPr/>
         </p:nvSpPr>
         <p:spPr>
           <a:xfrm>
             <a:off x="288000" y="288000"/>
-            <a:ext cx="1005120" cy="346320"/>
+            <a:ext cx="1004760" cy="345960"/>
           </a:xfrm>
           <a:prstGeom prst="rect">
             <a:avLst/>
@@ -5039,11 +5144,22 @@
             <a:noFill/>
           </a:ln>
         </p:spPr>
+        <p:style>
+          <a:lnRef idx="0"/>
+          <a:fillRef idx="0"/>
+          <a:effectRef idx="0"/>
+          <a:fontRef idx="minor"/>
+        </p:style>
         <p:txBody>
           <a:bodyPr lIns="90000" rIns="90000" tIns="45000" bIns="45000">
             <a:noAutofit/>
           </a:bodyPr>
           <a:p>
+            <a:pPr>
+              <a:lnSpc>
+                <a:spcPct val="100000"/>
+              </a:lnSpc>
+            </a:pPr>
             <a:r>
               <a:rPr b="0" lang="pt-BR" sz="1800" spc="-1" strike="noStrike">
                 <a:latin typeface="Arial"/>
@@ -5069,7 +5185,7 @@
         <p:spPr>
           <a:xfrm>
             <a:off x="9720000" y="1944000"/>
-            <a:ext cx="4600080" cy="3152520"/>
+            <a:ext cx="4599720" cy="3152160"/>
           </a:xfrm>
           <a:prstGeom prst="rect">
             <a:avLst/>
@@ -5092,7 +5208,7 @@
         <p:spPr>
           <a:xfrm>
             <a:off x="367920" y="1915920"/>
-            <a:ext cx="4600080" cy="3152520"/>
+            <a:ext cx="4599720" cy="3152160"/>
           </a:xfrm>
           <a:prstGeom prst="rect">
             <a:avLst/>
@@ -5115,7 +5231,7 @@
         <p:spPr>
           <a:xfrm>
             <a:off x="4968000" y="1887480"/>
-            <a:ext cx="4600080" cy="3152520"/>
+            <a:ext cx="4599720" cy="3152160"/>
           </a:xfrm>
           <a:prstGeom prst="rect">
             <a:avLst/>
@@ -5157,14 +5273,14 @@
       </p:grpSpPr>
       <p:sp>
         <p:nvSpPr>
-          <p:cNvPr id="114" name="TextShape 1"/>
-          <p:cNvSpPr txBox="1"/>
+          <p:cNvPr id="114" name="CustomShape 1"/>
+          <p:cNvSpPr/>
           <p:nvPr/>
         </p:nvSpPr>
         <p:spPr>
           <a:xfrm>
             <a:off x="288000" y="216000"/>
-            <a:ext cx="1224720" cy="346320"/>
+            <a:ext cx="1224360" cy="345960"/>
           </a:xfrm>
           <a:prstGeom prst="rect">
             <a:avLst/>
@@ -5174,11 +5290,22 @@
             <a:noFill/>
           </a:ln>
         </p:spPr>
+        <p:style>
+          <a:lnRef idx="0"/>
+          <a:fillRef idx="0"/>
+          <a:effectRef idx="0"/>
+          <a:fontRef idx="minor"/>
+        </p:style>
         <p:txBody>
           <a:bodyPr lIns="90000" rIns="90000" tIns="45000" bIns="45000">
             <a:noAutofit/>
           </a:bodyPr>
           <a:p>
+            <a:pPr>
+              <a:lnSpc>
+                <a:spcPct val="100000"/>
+              </a:lnSpc>
+            </a:pPr>
             <a:r>
               <a:rPr b="0" lang="pt-BR" sz="1800" spc="-1" strike="noStrike">
                 <a:latin typeface="Arial"/>
@@ -5204,7 +5331,7 @@
         <p:spPr>
           <a:xfrm>
             <a:off x="1951920" y="247680"/>
-            <a:ext cx="4600080" cy="3352320"/>
+            <a:ext cx="4599720" cy="3351960"/>
           </a:xfrm>
           <a:prstGeom prst="rect">
             <a:avLst/>
@@ -5227,7 +5354,7 @@
         <p:spPr>
           <a:xfrm>
             <a:off x="6652080" y="216000"/>
-            <a:ext cx="4723920" cy="3352320"/>
+            <a:ext cx="4723560" cy="3351960"/>
           </a:xfrm>
           <a:prstGeom prst="rect">
             <a:avLst/>
@@ -5250,7 +5377,7 @@
         <p:spPr>
           <a:xfrm>
             <a:off x="2160000" y="3399480"/>
-            <a:ext cx="4600080" cy="3152520"/>
+            <a:ext cx="4599720" cy="3152160"/>
           </a:xfrm>
           <a:prstGeom prst="rect">
             <a:avLst/>
@@ -5273,7 +5400,7 @@
         <p:spPr>
           <a:xfrm>
             <a:off x="6624000" y="3471480"/>
-            <a:ext cx="4723920" cy="3152520"/>
+            <a:ext cx="4723560" cy="3152160"/>
           </a:xfrm>
           <a:prstGeom prst="rect">
             <a:avLst/>

</xml_diff>

<commit_message>
fim do trabalho 2 GA
</commit_message>
<xml_diff>
--- a/GA/Trabalho2/Relatorio/Imagens/imagens.pptx
+++ b/GA/Trabalho2/Relatorio/Imagens/imagens.pptx
@@ -19,6 +19,7 @@
     <p:sldId id="266" r:id="rId14"/>
     <p:sldId id="267" r:id="rId15"/>
     <p:sldId id="268" r:id="rId16"/>
+    <p:sldId id="269" r:id="rId17"/>
   </p:sldIdLst>
   <p:sldSz cx="12192000" cy="6858000"/>
   <p:notesSz cx="7559675" cy="10691812"/>
@@ -2774,7 +2775,7 @@
         <p:spPr>
           <a:xfrm>
             <a:off x="609480" y="273600"/>
-            <a:ext cx="10972080" cy="1144440"/>
+            <a:ext cx="10972440" cy="1144800"/>
           </a:xfrm>
           <a:prstGeom prst="rect">
             <a:avLst/>
@@ -2785,13 +2786,14 @@
             <a:noAutofit/>
           </a:bodyPr>
           <a:p>
+            <a:pPr algn="ctr"/>
             <a:r>
-              <a:rPr b="0" lang="pt-BR" sz="1800" spc="-1" strike="noStrike">
+              <a:rPr b="0" lang="pt-BR" sz="4400" spc="-1" strike="noStrike">
                 <a:latin typeface="Arial"/>
               </a:rPr>
               <a:t>Click to edit the title text format</a:t>
             </a:r>
-            <a:endParaRPr b="0" lang="pt-BR" sz="1800" spc="-1" strike="noStrike">
+            <a:endParaRPr b="0" lang="pt-BR" sz="4400" spc="-1" strike="noStrike">
               <a:latin typeface="Arial"/>
             </a:endParaRPr>
           </a:p>
@@ -2810,7 +2812,7 @@
         <p:spPr>
           <a:xfrm>
             <a:off x="609480" y="1604520"/>
-            <a:ext cx="10972080" cy="3976920"/>
+            <a:ext cx="10972440" cy="3977280"/>
           </a:xfrm>
           <a:prstGeom prst="rect">
             <a:avLst/>
@@ -2833,12 +2835,12 @@
               <a:buChar char=""/>
             </a:pPr>
             <a:r>
-              <a:rPr b="0" lang="pt-BR" sz="1800" spc="-1" strike="noStrike">
+              <a:rPr b="0" lang="pt-BR" sz="3200" spc="-1" strike="noStrike">
                 <a:latin typeface="Arial"/>
               </a:rPr>
               <a:t>Click to edit the outline text format</a:t>
             </a:r>
-            <a:endParaRPr b="0" lang="pt-BR" sz="1800" spc="-1" strike="noStrike">
+            <a:endParaRPr b="0" lang="pt-BR" sz="3200" spc="-1" strike="noStrike">
               <a:latin typeface="Arial"/>
             </a:endParaRPr>
           </a:p>
@@ -2855,12 +2857,12 @@
               <a:buChar char=""/>
             </a:pPr>
             <a:r>
-              <a:rPr b="0" lang="pt-BR" sz="1800" spc="-1" strike="noStrike">
+              <a:rPr b="0" lang="pt-BR" sz="2800" spc="-1" strike="noStrike">
                 <a:latin typeface="Arial"/>
               </a:rPr>
               <a:t>Second Outline Level</a:t>
             </a:r>
-            <a:endParaRPr b="0" lang="pt-BR" sz="1800" spc="-1" strike="noStrike">
+            <a:endParaRPr b="0" lang="pt-BR" sz="2800" spc="-1" strike="noStrike">
               <a:latin typeface="Arial"/>
             </a:endParaRPr>
           </a:p>
@@ -2877,12 +2879,12 @@
               <a:buChar char=""/>
             </a:pPr>
             <a:r>
-              <a:rPr b="0" lang="pt-BR" sz="1800" spc="-1" strike="noStrike">
+              <a:rPr b="0" lang="pt-BR" sz="2400" spc="-1" strike="noStrike">
                 <a:latin typeface="Arial"/>
               </a:rPr>
               <a:t>Third Outline Level</a:t>
             </a:r>
-            <a:endParaRPr b="0" lang="pt-BR" sz="1800" spc="-1" strike="noStrike">
+            <a:endParaRPr b="0" lang="pt-BR" sz="2400" spc="-1" strike="noStrike">
               <a:latin typeface="Arial"/>
             </a:endParaRPr>
           </a:p>
@@ -2899,12 +2901,12 @@
               <a:buChar char=""/>
             </a:pPr>
             <a:r>
-              <a:rPr b="0" lang="pt-BR" sz="1800" spc="-1" strike="noStrike">
+              <a:rPr b="0" lang="pt-BR" sz="2000" spc="-1" strike="noStrike">
                 <a:latin typeface="Arial"/>
               </a:rPr>
               <a:t>Fourth Outline Level</a:t>
             </a:r>
-            <a:endParaRPr b="0" lang="pt-BR" sz="1800" spc="-1" strike="noStrike">
+            <a:endParaRPr b="0" lang="pt-BR" sz="2000" spc="-1" strike="noStrike">
               <a:latin typeface="Arial"/>
             </a:endParaRPr>
           </a:p>
@@ -2921,12 +2923,12 @@
               <a:buChar char=""/>
             </a:pPr>
             <a:r>
-              <a:rPr b="0" lang="pt-BR" sz="1800" spc="-1" strike="noStrike">
+              <a:rPr b="0" lang="pt-BR" sz="2000" spc="-1" strike="noStrike">
                 <a:latin typeface="Arial"/>
               </a:rPr>
               <a:t>Fifth Outline Level</a:t>
             </a:r>
-            <a:endParaRPr b="0" lang="pt-BR" sz="1800" spc="-1" strike="noStrike">
+            <a:endParaRPr b="0" lang="pt-BR" sz="2000" spc="-1" strike="noStrike">
               <a:latin typeface="Arial"/>
             </a:endParaRPr>
           </a:p>
@@ -2943,12 +2945,12 @@
               <a:buChar char=""/>
             </a:pPr>
             <a:r>
-              <a:rPr b="0" lang="pt-BR" sz="1800" spc="-1" strike="noStrike">
+              <a:rPr b="0" lang="pt-BR" sz="2000" spc="-1" strike="noStrike">
                 <a:latin typeface="Arial"/>
               </a:rPr>
               <a:t>Sixth Outline Level</a:t>
             </a:r>
-            <a:endParaRPr b="0" lang="pt-BR" sz="1800" spc="-1" strike="noStrike">
+            <a:endParaRPr b="0" lang="pt-BR" sz="2000" spc="-1" strike="noStrike">
               <a:latin typeface="Arial"/>
             </a:endParaRPr>
           </a:p>
@@ -2965,12 +2967,12 @@
               <a:buChar char=""/>
             </a:pPr>
             <a:r>
-              <a:rPr b="0" lang="pt-BR" sz="1800" spc="-1" strike="noStrike">
+              <a:rPr b="0" lang="pt-BR" sz="2000" spc="-1" strike="noStrike">
                 <a:latin typeface="Arial"/>
               </a:rPr>
               <a:t>Seventh Outline Level</a:t>
             </a:r>
-            <a:endParaRPr b="0" lang="pt-BR" sz="1800" spc="-1" strike="noStrike">
+            <a:endParaRPr b="0" lang="pt-BR" sz="2000" spc="-1" strike="noStrike">
               <a:latin typeface="Arial"/>
             </a:endParaRPr>
           </a:p>
@@ -3273,16 +3275,92 @@
           <a:chExt cx="0" cy="0"/>
         </a:xfrm>
       </p:grpSpPr>
-      <p:sp>
-        <p:nvSpPr>
-          <p:cNvPr id="76" name="CustomShape 1"/>
+      <p:pic>
+        <p:nvPicPr>
+          <p:cNvPr id="76" name="" descr=""/>
+          <p:cNvPicPr/>
+          <p:nvPr/>
+        </p:nvPicPr>
+        <p:blipFill>
+          <a:blip r:embed="rId1"/>
+          <a:stretch/>
+        </p:blipFill>
+        <p:spPr>
+          <a:xfrm>
+            <a:off x="6165360" y="487800"/>
+            <a:ext cx="4613760" cy="3359880"/>
+          </a:xfrm>
+          <a:prstGeom prst="rect">
+            <a:avLst/>
+          </a:prstGeom>
+          <a:ln>
+            <a:noFill/>
+          </a:ln>
+        </p:spPr>
+      </p:pic>
+      <p:pic>
+        <p:nvPicPr>
+          <p:cNvPr id="77" name="" descr=""/>
+          <p:cNvPicPr/>
+          <p:nvPr/>
+        </p:nvPicPr>
+        <p:blipFill>
+          <a:blip r:embed="rId2"/>
+          <a:stretch/>
+        </p:blipFill>
+        <p:spPr>
+          <a:xfrm>
+            <a:off x="864000" y="794520"/>
+            <a:ext cx="4613760" cy="3165480"/>
+          </a:xfrm>
+          <a:prstGeom prst="rect">
+            <a:avLst/>
+          </a:prstGeom>
+          <a:ln>
+            <a:noFill/>
+          </a:ln>
+        </p:spPr>
+      </p:pic>
+    </p:spTree>
+  </p:cSld>
+  <mc:AlternateContent>
+    <mc:Choice Requires="p14">
+      <p:transition spd="slow" p14:dur="2000"/>
+    </mc:Choice>
+    <mc:Fallback>
+      <p:transition spd="slow"/>
+    </mc:Fallback>
+  </mc:AlternateContent>
+</p:sld>
+</file>
+
+<file path=ppt/slides/slide10.xml><?xml version="1.0" encoding="utf-8"?>
+<p:sld xmlns:a="http://schemas.openxmlformats.org/drawingml/2006/main" xmlns:p="http://schemas.openxmlformats.org/presentationml/2006/main" xmlns:r="http://schemas.openxmlformats.org/officeDocument/2006/relationships" xmlns:p14="http://schemas.microsoft.com/office/powerpoint/2010/main" xmlns:p15="http://schemas.microsoft.com/office/powerpoint/2012/main" xmlns:mc="http://schemas.openxmlformats.org/markup-compatibility/2006">
+  <p:cSld>
+    <p:spTree>
+      <p:nvGrpSpPr>
+        <p:cNvPr id="1" name=""/>
+        <p:cNvGrpSpPr/>
+        <p:nvPr/>
+      </p:nvGrpSpPr>
+      <p:grpSpPr>
+        <a:xfrm>
+          <a:off x="0" y="0"/>
+          <a:ext cx="0" cy="0"/>
+          <a:chOff x="0" y="0"/>
+          <a:chExt cx="0" cy="0"/>
+        </a:xfrm>
+      </p:grpSpPr>
+      <p:sp>
+        <p:nvSpPr>
+          <p:cNvPr id="125" name="CustomShape 1"/>
           <p:cNvSpPr/>
           <p:nvPr/>
         </p:nvSpPr>
         <p:spPr>
           <a:xfrm>
-            <a:off x="246240" y="144000"/>
-            <a:ext cx="2818080" cy="601560"/>
+            <a:off x="288000" y="216000"/>
+            <a:ext cx="1223640" cy="345240"/>
           </a:xfrm>
           <a:prstGeom prst="rect">
             <a:avLst/>
@@ -3316,18 +3394,902 @@
                 <a:latin typeface="Arial"/>
                 <a:ea typeface="DejaVu Sans"/>
               </a:rPr>
-              <a:t>Max num iterarions 10 50 </a:t>
+              <a:t>Tipo cross</a:t>
             </a:r>
             <a:endParaRPr b="0" lang="pt-BR" sz="1800" spc="-1" strike="noStrike">
               <a:latin typeface="Arial"/>
             </a:endParaRPr>
           </a:p>
+        </p:txBody>
+      </p:sp>
+      <p:grpSp>
+        <p:nvGrpSpPr>
+          <p:cNvPr id="126" name="Group 2"/>
+          <p:cNvGrpSpPr/>
+          <p:nvPr/>
+        </p:nvGrpSpPr>
+        <p:grpSpPr>
+          <a:xfrm>
+            <a:off x="1607400" y="216000"/>
+            <a:ext cx="9738000" cy="6406200"/>
+            <a:chOff x="1607400" y="216000"/>
+            <a:chExt cx="9738000" cy="6406200"/>
+          </a:xfrm>
+        </p:grpSpPr>
+        <p:pic>
+          <p:nvPicPr>
+            <p:cNvPr id="127" name="Imagem 114" descr=""/>
+            <p:cNvPicPr/>
+            <p:nvPr/>
+          </p:nvPicPr>
+          <p:blipFill>
+            <a:blip r:embed="rId1"/>
+            <a:stretch/>
+          </p:blipFill>
+          <p:spPr>
+            <a:xfrm>
+              <a:off x="1693800" y="216000"/>
+              <a:ext cx="4569840" cy="3331440"/>
+            </a:xfrm>
+            <a:prstGeom prst="rect">
+              <a:avLst/>
+            </a:prstGeom>
+            <a:ln>
+              <a:noFill/>
+            </a:ln>
+          </p:spPr>
+        </p:pic>
+        <p:pic>
+          <p:nvPicPr>
+            <p:cNvPr id="128" name="Imagem 115" descr=""/>
+            <p:cNvPicPr/>
+            <p:nvPr/>
+          </p:nvPicPr>
+          <p:blipFill>
+            <a:blip r:embed="rId2"/>
+            <a:stretch/>
+          </p:blipFill>
+          <p:spPr>
+            <a:xfrm>
+              <a:off x="6653520" y="216000"/>
+              <a:ext cx="4691880" cy="3331440"/>
+            </a:xfrm>
+            <a:prstGeom prst="rect">
+              <a:avLst/>
+            </a:prstGeom>
+            <a:ln>
+              <a:noFill/>
+            </a:ln>
+          </p:spPr>
+        </p:pic>
+        <p:pic>
+          <p:nvPicPr>
+            <p:cNvPr id="129" name="Imagem 116" descr=""/>
+            <p:cNvPicPr/>
+            <p:nvPr/>
+          </p:nvPicPr>
+          <p:blipFill>
+            <a:blip r:embed="rId3"/>
+            <a:stretch/>
+          </p:blipFill>
+          <p:spPr>
+            <a:xfrm>
+              <a:off x="1607400" y="3290760"/>
+              <a:ext cx="4858560" cy="3331440"/>
+            </a:xfrm>
+            <a:prstGeom prst="rect">
+              <a:avLst/>
+            </a:prstGeom>
+            <a:ln>
+              <a:noFill/>
+            </a:ln>
+          </p:spPr>
+        </p:pic>
+        <p:pic>
+          <p:nvPicPr>
+            <p:cNvPr id="130" name="Imagem 117" descr=""/>
+            <p:cNvPicPr/>
+            <p:nvPr/>
+          </p:nvPicPr>
+          <p:blipFill>
+            <a:blip r:embed="rId4"/>
+            <a:stretch/>
+          </p:blipFill>
+          <p:spPr>
+            <a:xfrm>
+              <a:off x="6351480" y="3290760"/>
+              <a:ext cx="4993560" cy="3331440"/>
+            </a:xfrm>
+            <a:prstGeom prst="rect">
+              <a:avLst/>
+            </a:prstGeom>
+            <a:ln>
+              <a:noFill/>
+            </a:ln>
+          </p:spPr>
+        </p:pic>
+      </p:grpSp>
+    </p:spTree>
+  </p:cSld>
+  <mc:AlternateContent>
+    <mc:Choice Requires="p14">
+      <p:transition spd="slow" p14:dur="2000"/>
+    </mc:Choice>
+    <mc:Fallback>
+      <p:transition spd="slow"/>
+    </mc:Fallback>
+  </mc:AlternateContent>
+</p:sld>
+</file>
+
+<file path=ppt/slides/slide11.xml><?xml version="1.0" encoding="utf-8"?>
+<p:sld xmlns:a="http://schemas.openxmlformats.org/drawingml/2006/main" xmlns:p="http://schemas.openxmlformats.org/presentationml/2006/main" xmlns:r="http://schemas.openxmlformats.org/officeDocument/2006/relationships" xmlns:p14="http://schemas.microsoft.com/office/powerpoint/2010/main" xmlns:p15="http://schemas.microsoft.com/office/powerpoint/2012/main" xmlns:mc="http://schemas.openxmlformats.org/markup-compatibility/2006">
+  <p:cSld>
+    <p:spTree>
+      <p:nvGrpSpPr>
+        <p:cNvPr id="1" name=""/>
+        <p:cNvGrpSpPr/>
+        <p:nvPr/>
+      </p:nvGrpSpPr>
+      <p:grpSpPr>
+        <a:xfrm>
+          <a:off x="0" y="0"/>
+          <a:ext cx="0" cy="0"/>
+          <a:chOff x="0" y="0"/>
+          <a:chExt cx="0" cy="0"/>
+        </a:xfrm>
+      </p:grpSpPr>
+      <p:sp>
+        <p:nvSpPr>
+          <p:cNvPr id="131" name="CustomShape 1"/>
+          <p:cNvSpPr/>
+          <p:nvPr/>
+        </p:nvSpPr>
+        <p:spPr>
+          <a:xfrm>
+            <a:off x="138240" y="216000"/>
+            <a:ext cx="1156680" cy="345240"/>
+          </a:xfrm>
+          <a:prstGeom prst="rect">
+            <a:avLst/>
+          </a:prstGeom>
+          <a:noFill/>
+          <a:ln>
+            <a:noFill/>
+          </a:ln>
+        </p:spPr>
+        <p:style>
+          <a:lnRef idx="0"/>
+          <a:fillRef idx="0"/>
+          <a:effectRef idx="0"/>
+          <a:fontRef idx="minor"/>
+        </p:style>
+        <p:txBody>
+          <a:bodyPr lIns="90000" rIns="90000" tIns="45000" bIns="45000">
+            <a:noAutofit/>
+          </a:bodyPr>
           <a:p>
             <a:pPr>
               <a:lnSpc>
                 <a:spcPct val="100000"/>
               </a:lnSpc>
             </a:pPr>
+            <a:r>
+              <a:rPr b="0" lang="pt-BR" sz="1800" spc="-1" strike="noStrike">
+                <a:solidFill>
+                  <a:srgbClr val="000000"/>
+                </a:solidFill>
+                <a:latin typeface="Arial"/>
+                <a:ea typeface="DejaVu Sans"/>
+              </a:rPr>
+              <a:t>taxacross</a:t>
+            </a:r>
+            <a:endParaRPr b="0" lang="pt-BR" sz="1800" spc="-1" strike="noStrike">
+              <a:latin typeface="Arial"/>
+            </a:endParaRPr>
+          </a:p>
+        </p:txBody>
+      </p:sp>
+      <p:grpSp>
+        <p:nvGrpSpPr>
+          <p:cNvPr id="132" name="Group 2"/>
+          <p:cNvGrpSpPr/>
+          <p:nvPr/>
+        </p:nvGrpSpPr>
+        <p:grpSpPr>
+          <a:xfrm>
+            <a:off x="79200" y="1415880"/>
+            <a:ext cx="13591800" cy="3351960"/>
+            <a:chOff x="79200" y="1415880"/>
+            <a:chExt cx="13591800" cy="3351960"/>
+          </a:xfrm>
+        </p:grpSpPr>
+        <p:pic>
+          <p:nvPicPr>
+            <p:cNvPr id="133" name="Imagem 119" descr=""/>
+            <p:cNvPicPr/>
+            <p:nvPr/>
+          </p:nvPicPr>
+          <p:blipFill>
+            <a:blip r:embed="rId1"/>
+            <a:stretch/>
+          </p:blipFill>
+          <p:spPr>
+            <a:xfrm>
+              <a:off x="9066240" y="1415880"/>
+              <a:ext cx="4604760" cy="3351960"/>
+            </a:xfrm>
+            <a:prstGeom prst="rect">
+              <a:avLst/>
+            </a:prstGeom>
+            <a:ln>
+              <a:noFill/>
+            </a:ln>
+          </p:spPr>
+        </p:pic>
+        <p:pic>
+          <p:nvPicPr>
+            <p:cNvPr id="134" name="Imagem 120" descr=""/>
+            <p:cNvPicPr/>
+            <p:nvPr/>
+          </p:nvPicPr>
+          <p:blipFill>
+            <a:blip r:embed="rId2"/>
+            <a:stretch/>
+          </p:blipFill>
+          <p:spPr>
+            <a:xfrm>
+              <a:off x="79200" y="1415880"/>
+              <a:ext cx="4599720" cy="3351960"/>
+            </a:xfrm>
+            <a:prstGeom prst="rect">
+              <a:avLst/>
+            </a:prstGeom>
+            <a:ln>
+              <a:noFill/>
+            </a:ln>
+          </p:spPr>
+        </p:pic>
+        <p:pic>
+          <p:nvPicPr>
+            <p:cNvPr id="135" name="Imagem 121" descr=""/>
+            <p:cNvPicPr/>
+            <p:nvPr/>
+          </p:nvPicPr>
+          <p:blipFill>
+            <a:blip r:embed="rId3"/>
+            <a:stretch/>
+          </p:blipFill>
+          <p:spPr>
+            <a:xfrm>
+              <a:off x="4573440" y="1415880"/>
+              <a:ext cx="4598280" cy="3351960"/>
+            </a:xfrm>
+            <a:prstGeom prst="rect">
+              <a:avLst/>
+            </a:prstGeom>
+            <a:ln>
+              <a:noFill/>
+            </a:ln>
+          </p:spPr>
+        </p:pic>
+      </p:grpSp>
+    </p:spTree>
+  </p:cSld>
+  <mc:AlternateContent>
+    <mc:Choice Requires="p14">
+      <p:transition spd="slow" p14:dur="2000"/>
+    </mc:Choice>
+    <mc:Fallback>
+      <p:transition spd="slow"/>
+    </mc:Fallback>
+  </mc:AlternateContent>
+</p:sld>
+</file>
+
+<file path=ppt/slides/slide12.xml><?xml version="1.0" encoding="utf-8"?>
+<p:sld xmlns:a="http://schemas.openxmlformats.org/drawingml/2006/main" xmlns:p="http://schemas.openxmlformats.org/presentationml/2006/main" xmlns:r="http://schemas.openxmlformats.org/officeDocument/2006/relationships" xmlns:p14="http://schemas.microsoft.com/office/powerpoint/2010/main" xmlns:p15="http://schemas.microsoft.com/office/powerpoint/2012/main" xmlns:mc="http://schemas.openxmlformats.org/markup-compatibility/2006">
+  <p:cSld>
+    <p:spTree>
+      <p:nvGrpSpPr>
+        <p:cNvPr id="1" name=""/>
+        <p:cNvGrpSpPr/>
+        <p:nvPr/>
+      </p:nvGrpSpPr>
+      <p:grpSpPr>
+        <a:xfrm>
+          <a:off x="0" y="0"/>
+          <a:ext cx="0" cy="0"/>
+          <a:chOff x="0" y="0"/>
+          <a:chExt cx="0" cy="0"/>
+        </a:xfrm>
+      </p:grpSpPr>
+      <p:sp>
+        <p:nvSpPr>
+          <p:cNvPr id="136" name="CustomShape 1"/>
+          <p:cNvSpPr/>
+          <p:nvPr/>
+        </p:nvSpPr>
+        <p:spPr>
+          <a:xfrm>
+            <a:off x="138240" y="216000"/>
+            <a:ext cx="1156680" cy="345240"/>
+          </a:xfrm>
+          <a:prstGeom prst="rect">
+            <a:avLst/>
+          </a:prstGeom>
+          <a:noFill/>
+          <a:ln>
+            <a:noFill/>
+          </a:ln>
+        </p:spPr>
+        <p:style>
+          <a:lnRef idx="0"/>
+          <a:fillRef idx="0"/>
+          <a:effectRef idx="0"/>
+          <a:fontRef idx="minor"/>
+        </p:style>
+        <p:txBody>
+          <a:bodyPr lIns="90000" rIns="90000" tIns="45000" bIns="45000">
+            <a:noAutofit/>
+          </a:bodyPr>
+          <a:p>
+            <a:pPr>
+              <a:lnSpc>
+                <a:spcPct val="100000"/>
+              </a:lnSpc>
+            </a:pPr>
+            <a:r>
+              <a:rPr b="0" lang="pt-BR" sz="1800" spc="-1" strike="noStrike">
+                <a:solidFill>
+                  <a:srgbClr val="000000"/>
+                </a:solidFill>
+                <a:latin typeface="Arial"/>
+                <a:ea typeface="DejaVu Sans"/>
+              </a:rPr>
+              <a:t>taxacross</a:t>
+            </a:r>
+            <a:endParaRPr b="0" lang="pt-BR" sz="1800" spc="-1" strike="noStrike">
+              <a:latin typeface="Arial"/>
+            </a:endParaRPr>
+          </a:p>
+        </p:txBody>
+      </p:sp>
+      <p:grpSp>
+        <p:nvGrpSpPr>
+          <p:cNvPr id="137" name="Group 2"/>
+          <p:cNvGrpSpPr/>
+          <p:nvPr/>
+        </p:nvGrpSpPr>
+        <p:grpSpPr>
+          <a:xfrm>
+            <a:off x="-1576440" y="1852560"/>
+            <a:ext cx="14029560" cy="3169440"/>
+            <a:chOff x="-1576440" y="1852560"/>
+            <a:chExt cx="14029560" cy="3169440"/>
+          </a:xfrm>
+        </p:grpSpPr>
+        <p:pic>
+          <p:nvPicPr>
+            <p:cNvPr id="138" name="Imagem 123" descr=""/>
+            <p:cNvPicPr/>
+            <p:nvPr/>
+          </p:nvPicPr>
+          <p:blipFill>
+            <a:blip r:embed="rId1"/>
+            <a:stretch/>
+          </p:blipFill>
+          <p:spPr>
+            <a:xfrm>
+              <a:off x="7854840" y="1852560"/>
+              <a:ext cx="4598280" cy="3169440"/>
+            </a:xfrm>
+            <a:prstGeom prst="rect">
+              <a:avLst/>
+            </a:prstGeom>
+            <a:ln>
+              <a:noFill/>
+            </a:ln>
+          </p:spPr>
+        </p:pic>
+        <p:pic>
+          <p:nvPicPr>
+            <p:cNvPr id="139" name="Imagem 124" descr=""/>
+            <p:cNvPicPr/>
+            <p:nvPr/>
+          </p:nvPicPr>
+          <p:blipFill>
+            <a:blip r:embed="rId2"/>
+            <a:stretch/>
+          </p:blipFill>
+          <p:spPr>
+            <a:xfrm>
+              <a:off x="-1576440" y="1852560"/>
+              <a:ext cx="4626720" cy="3169440"/>
+            </a:xfrm>
+            <a:prstGeom prst="rect">
+              <a:avLst/>
+            </a:prstGeom>
+            <a:ln>
+              <a:noFill/>
+            </a:ln>
+          </p:spPr>
+        </p:pic>
+        <p:pic>
+          <p:nvPicPr>
+            <p:cNvPr id="140" name="Imagem 125" descr=""/>
+            <p:cNvPicPr/>
+            <p:nvPr/>
+          </p:nvPicPr>
+          <p:blipFill>
+            <a:blip r:embed="rId3"/>
+            <a:stretch/>
+          </p:blipFill>
+          <p:spPr>
+            <a:xfrm>
+              <a:off x="3168720" y="1852560"/>
+              <a:ext cx="4568040" cy="3169440"/>
+            </a:xfrm>
+            <a:prstGeom prst="rect">
+              <a:avLst/>
+            </a:prstGeom>
+            <a:ln>
+              <a:noFill/>
+            </a:ln>
+          </p:spPr>
+        </p:pic>
+      </p:grpSp>
+    </p:spTree>
+  </p:cSld>
+  <mc:AlternateContent>
+    <mc:Choice Requires="p14">
+      <p:transition spd="slow" p14:dur="2000"/>
+    </mc:Choice>
+    <mc:Fallback>
+      <p:transition spd="slow"/>
+    </mc:Fallback>
+  </mc:AlternateContent>
+</p:sld>
+</file>
+
+<file path=ppt/slides/slide13.xml><?xml version="1.0" encoding="utf-8"?>
+<p:sld xmlns:a="http://schemas.openxmlformats.org/drawingml/2006/main" xmlns:p="http://schemas.openxmlformats.org/presentationml/2006/main" xmlns:r="http://schemas.openxmlformats.org/officeDocument/2006/relationships" xmlns:p14="http://schemas.microsoft.com/office/powerpoint/2010/main" xmlns:p15="http://schemas.microsoft.com/office/powerpoint/2012/main" xmlns:mc="http://schemas.openxmlformats.org/markup-compatibility/2006">
+  <p:cSld>
+    <p:spTree>
+      <p:nvGrpSpPr>
+        <p:cNvPr id="1" name=""/>
+        <p:cNvGrpSpPr/>
+        <p:nvPr/>
+      </p:nvGrpSpPr>
+      <p:grpSpPr>
+        <a:xfrm>
+          <a:off x="0" y="0"/>
+          <a:ext cx="0" cy="0"/>
+          <a:chOff x="0" y="0"/>
+          <a:chExt cx="0" cy="0"/>
+        </a:xfrm>
+      </p:grpSpPr>
+      <p:sp>
+        <p:nvSpPr>
+          <p:cNvPr id="141" name="CustomShape 1"/>
+          <p:cNvSpPr/>
+          <p:nvPr/>
+        </p:nvSpPr>
+        <p:spPr>
+          <a:xfrm>
+            <a:off x="144000" y="157680"/>
+            <a:ext cx="1726920" cy="345600"/>
+          </a:xfrm>
+          <a:prstGeom prst="rect">
+            <a:avLst/>
+          </a:prstGeom>
+          <a:noFill/>
+          <a:ln>
+            <a:noFill/>
+          </a:ln>
+        </p:spPr>
+        <p:style>
+          <a:lnRef idx="0"/>
+          <a:fillRef idx="0"/>
+          <a:effectRef idx="0"/>
+          <a:fontRef idx="minor"/>
+        </p:style>
+        <p:txBody>
+          <a:bodyPr lIns="90000" rIns="90000" tIns="45000" bIns="45000">
+            <a:noAutofit/>
+          </a:bodyPr>
+          <a:p>
+            <a:pPr>
+              <a:lnSpc>
+                <a:spcPct val="100000"/>
+              </a:lnSpc>
+            </a:pPr>
+            <a:r>
+              <a:rPr b="0" lang="pt-BR" sz="1800" spc="-1" strike="noStrike">
+                <a:solidFill>
+                  <a:srgbClr val="000000"/>
+                </a:solidFill>
+                <a:latin typeface="Arial"/>
+                <a:ea typeface="DejaVu Sans"/>
+              </a:rPr>
+              <a:t>Parents portion</a:t>
+            </a:r>
+            <a:endParaRPr b="0" lang="pt-BR" sz="1800" spc="-1" strike="noStrike">
+              <a:latin typeface="Arial"/>
+            </a:endParaRPr>
+          </a:p>
+        </p:txBody>
+      </p:sp>
+      <p:grpSp>
+        <p:nvGrpSpPr>
+          <p:cNvPr id="142" name="Group 2"/>
+          <p:cNvGrpSpPr/>
+          <p:nvPr/>
+        </p:nvGrpSpPr>
+        <p:grpSpPr>
+          <a:xfrm>
+            <a:off x="1171440" y="304920"/>
+            <a:ext cx="9283680" cy="6628320"/>
+            <a:chOff x="1171440" y="304920"/>
+            <a:chExt cx="9283680" cy="6628320"/>
+          </a:xfrm>
+        </p:grpSpPr>
+        <p:pic>
+          <p:nvPicPr>
+            <p:cNvPr id="143" name="Imagem 127" descr=""/>
+            <p:cNvPicPr/>
+            <p:nvPr/>
+          </p:nvPicPr>
+          <p:blipFill>
+            <a:blip r:embed="rId1"/>
+            <a:stretch/>
+          </p:blipFill>
+          <p:spPr>
+            <a:xfrm>
+              <a:off x="1171440" y="3581280"/>
+              <a:ext cx="4723560" cy="3351960"/>
+            </a:xfrm>
+            <a:prstGeom prst="rect">
+              <a:avLst/>
+            </a:prstGeom>
+            <a:ln>
+              <a:noFill/>
+            </a:ln>
+          </p:spPr>
+        </p:pic>
+        <p:pic>
+          <p:nvPicPr>
+            <p:cNvPr id="144" name="Imagem 128" descr=""/>
+            <p:cNvPicPr/>
+            <p:nvPr/>
+          </p:nvPicPr>
+          <p:blipFill>
+            <a:blip r:embed="rId2"/>
+            <a:stretch/>
+          </p:blipFill>
+          <p:spPr>
+            <a:xfrm>
+              <a:off x="5855040" y="305280"/>
+              <a:ext cx="4599360" cy="3351600"/>
+            </a:xfrm>
+            <a:prstGeom prst="rect">
+              <a:avLst/>
+            </a:prstGeom>
+            <a:ln>
+              <a:noFill/>
+            </a:ln>
+          </p:spPr>
+        </p:pic>
+        <p:pic>
+          <p:nvPicPr>
+            <p:cNvPr id="145" name="Imagem 129" descr=""/>
+            <p:cNvPicPr/>
+            <p:nvPr/>
+          </p:nvPicPr>
+          <p:blipFill>
+            <a:blip r:embed="rId3"/>
+            <a:stretch/>
+          </p:blipFill>
+          <p:spPr>
+            <a:xfrm>
+              <a:off x="1297080" y="304920"/>
+              <a:ext cx="4599720" cy="3351960"/>
+            </a:xfrm>
+            <a:prstGeom prst="rect">
+              <a:avLst/>
+            </a:prstGeom>
+            <a:ln>
+              <a:noFill/>
+            </a:ln>
+          </p:spPr>
+        </p:pic>
+        <p:pic>
+          <p:nvPicPr>
+            <p:cNvPr id="146" name="Imagem 130" descr=""/>
+            <p:cNvPicPr/>
+            <p:nvPr/>
+          </p:nvPicPr>
+          <p:blipFill>
+            <a:blip r:embed="rId4"/>
+            <a:stretch/>
+          </p:blipFill>
+          <p:spPr>
+            <a:xfrm>
+              <a:off x="5855400" y="3581280"/>
+              <a:ext cx="4599720" cy="3351960"/>
+            </a:xfrm>
+            <a:prstGeom prst="rect">
+              <a:avLst/>
+            </a:prstGeom>
+            <a:ln>
+              <a:noFill/>
+            </a:ln>
+          </p:spPr>
+        </p:pic>
+      </p:grpSp>
+    </p:spTree>
+  </p:cSld>
+  <mc:AlternateContent>
+    <mc:Choice Requires="p14">
+      <p:transition spd="slow" p14:dur="2000"/>
+    </mc:Choice>
+    <mc:Fallback>
+      <p:transition spd="slow"/>
+    </mc:Fallback>
+  </mc:AlternateContent>
+</p:sld>
+</file>
+
+<file path=ppt/slides/slide14.xml><?xml version="1.0" encoding="utf-8"?>
+<p:sld xmlns:a="http://schemas.openxmlformats.org/drawingml/2006/main" xmlns:p="http://schemas.openxmlformats.org/presentationml/2006/main" xmlns:r="http://schemas.openxmlformats.org/officeDocument/2006/relationships" xmlns:p14="http://schemas.microsoft.com/office/powerpoint/2010/main" xmlns:p15="http://schemas.microsoft.com/office/powerpoint/2012/main" xmlns:mc="http://schemas.openxmlformats.org/markup-compatibility/2006">
+  <p:cSld>
+    <p:spTree>
+      <p:nvGrpSpPr>
+        <p:cNvPr id="1" name=""/>
+        <p:cNvGrpSpPr/>
+        <p:nvPr/>
+      </p:nvGrpSpPr>
+      <p:grpSpPr>
+        <a:xfrm>
+          <a:off x="0" y="0"/>
+          <a:ext cx="0" cy="0"/>
+          <a:chOff x="0" y="0"/>
+          <a:chExt cx="0" cy="0"/>
+        </a:xfrm>
+      </p:grpSpPr>
+      <p:sp>
+        <p:nvSpPr>
+          <p:cNvPr id="147" name="CustomShape 1"/>
+          <p:cNvSpPr/>
+          <p:nvPr/>
+        </p:nvSpPr>
+        <p:spPr>
+          <a:xfrm>
+            <a:off x="144000" y="157680"/>
+            <a:ext cx="1726920" cy="345600"/>
+          </a:xfrm>
+          <a:prstGeom prst="rect">
+            <a:avLst/>
+          </a:prstGeom>
+          <a:noFill/>
+          <a:ln>
+            <a:noFill/>
+          </a:ln>
+        </p:spPr>
+        <p:style>
+          <a:lnRef idx="0"/>
+          <a:fillRef idx="0"/>
+          <a:effectRef idx="0"/>
+          <a:fontRef idx="minor"/>
+        </p:style>
+        <p:txBody>
+          <a:bodyPr lIns="90000" rIns="90000" tIns="45000" bIns="45000">
+            <a:noAutofit/>
+          </a:bodyPr>
+          <a:p>
+            <a:pPr>
+              <a:lnSpc>
+                <a:spcPct val="100000"/>
+              </a:lnSpc>
+            </a:pPr>
+            <a:r>
+              <a:rPr b="0" lang="pt-BR" sz="1800" spc="-1" strike="noStrike">
+                <a:solidFill>
+                  <a:srgbClr val="000000"/>
+                </a:solidFill>
+                <a:latin typeface="Arial"/>
+                <a:ea typeface="DejaVu Sans"/>
+              </a:rPr>
+              <a:t>Parents portion</a:t>
+            </a:r>
+            <a:endParaRPr b="0" lang="pt-BR" sz="1800" spc="-1" strike="noStrike">
+              <a:latin typeface="Arial"/>
+            </a:endParaRPr>
+          </a:p>
+        </p:txBody>
+      </p:sp>
+      <p:grpSp>
+        <p:nvGrpSpPr>
+          <p:cNvPr id="148" name="Group 2"/>
+          <p:cNvGrpSpPr/>
+          <p:nvPr/>
+        </p:nvGrpSpPr>
+        <p:grpSpPr>
+          <a:xfrm>
+            <a:off x="1486080" y="390600"/>
+            <a:ext cx="9313200" cy="6305040"/>
+            <a:chOff x="1486080" y="390600"/>
+            <a:chExt cx="9313200" cy="6305040"/>
+          </a:xfrm>
+        </p:grpSpPr>
+        <p:pic>
+          <p:nvPicPr>
+            <p:cNvPr id="149" name="Imagem 132" descr=""/>
+            <p:cNvPicPr/>
+            <p:nvPr/>
+          </p:nvPicPr>
+          <p:blipFill>
+            <a:blip r:embed="rId1"/>
+            <a:stretch/>
+          </p:blipFill>
+          <p:spPr>
+            <a:xfrm>
+              <a:off x="6076080" y="3543480"/>
+              <a:ext cx="4723200" cy="3151800"/>
+            </a:xfrm>
+            <a:prstGeom prst="rect">
+              <a:avLst/>
+            </a:prstGeom>
+            <a:ln>
+              <a:noFill/>
+            </a:ln>
+          </p:spPr>
+        </p:pic>
+        <p:pic>
+          <p:nvPicPr>
+            <p:cNvPr id="150" name="Imagem 133" descr=""/>
+            <p:cNvPicPr/>
+            <p:nvPr/>
+          </p:nvPicPr>
+          <p:blipFill>
+            <a:blip r:embed="rId2"/>
+            <a:stretch/>
+          </p:blipFill>
+          <p:spPr>
+            <a:xfrm>
+              <a:off x="6076080" y="390960"/>
+              <a:ext cx="4599360" cy="3151800"/>
+            </a:xfrm>
+            <a:prstGeom prst="rect">
+              <a:avLst/>
+            </a:prstGeom>
+            <a:ln>
+              <a:noFill/>
+            </a:ln>
+          </p:spPr>
+        </p:pic>
+        <p:pic>
+          <p:nvPicPr>
+            <p:cNvPr id="151" name="Imagem 134" descr=""/>
+            <p:cNvPicPr/>
+            <p:nvPr/>
+          </p:nvPicPr>
+          <p:blipFill>
+            <a:blip r:embed="rId3"/>
+            <a:stretch/>
+          </p:blipFill>
+          <p:spPr>
+            <a:xfrm>
+              <a:off x="1486080" y="390600"/>
+              <a:ext cx="4599720" cy="3152160"/>
+            </a:xfrm>
+            <a:prstGeom prst="rect">
+              <a:avLst/>
+            </a:prstGeom>
+            <a:ln>
+              <a:noFill/>
+            </a:ln>
+          </p:spPr>
+        </p:pic>
+        <p:pic>
+          <p:nvPicPr>
+            <p:cNvPr id="152" name="Imagem 135" descr=""/>
+            <p:cNvPicPr/>
+            <p:nvPr/>
+          </p:nvPicPr>
+          <p:blipFill>
+            <a:blip r:embed="rId4"/>
+            <a:stretch/>
+          </p:blipFill>
+          <p:spPr>
+            <a:xfrm>
+              <a:off x="1486080" y="3543480"/>
+              <a:ext cx="4599720" cy="3152160"/>
+            </a:xfrm>
+            <a:prstGeom prst="rect">
+              <a:avLst/>
+            </a:prstGeom>
+            <a:ln>
+              <a:noFill/>
+            </a:ln>
+          </p:spPr>
+        </p:pic>
+      </p:grpSp>
+    </p:spTree>
+  </p:cSld>
+  <mc:AlternateContent>
+    <mc:Choice Requires="p14">
+      <p:transition spd="slow" p14:dur="2000"/>
+    </mc:Choice>
+    <mc:Fallback>
+      <p:transition spd="slow"/>
+    </mc:Fallback>
+  </mc:AlternateContent>
+</p:sld>
+</file>
+
+<file path=ppt/slides/slide2.xml><?xml version="1.0" encoding="utf-8"?>
+<p:sld xmlns:a="http://schemas.openxmlformats.org/drawingml/2006/main" xmlns:p="http://schemas.openxmlformats.org/presentationml/2006/main" xmlns:r="http://schemas.openxmlformats.org/officeDocument/2006/relationships" xmlns:p14="http://schemas.microsoft.com/office/powerpoint/2010/main" xmlns:p15="http://schemas.microsoft.com/office/powerpoint/2012/main" xmlns:mc="http://schemas.openxmlformats.org/markup-compatibility/2006">
+  <p:cSld>
+    <p:spTree>
+      <p:nvGrpSpPr>
+        <p:cNvPr id="1" name=""/>
+        <p:cNvGrpSpPr/>
+        <p:nvPr/>
+      </p:nvGrpSpPr>
+      <p:grpSpPr>
+        <a:xfrm>
+          <a:off x="0" y="0"/>
+          <a:ext cx="0" cy="0"/>
+          <a:chOff x="0" y="0"/>
+          <a:chExt cx="0" cy="0"/>
+        </a:xfrm>
+      </p:grpSpPr>
+      <p:sp>
+        <p:nvSpPr>
+          <p:cNvPr id="78" name="CustomShape 1"/>
+          <p:cNvSpPr/>
+          <p:nvPr/>
+        </p:nvSpPr>
+        <p:spPr>
+          <a:xfrm>
+            <a:off x="246240" y="144000"/>
+            <a:ext cx="5189760" cy="572040"/>
+          </a:xfrm>
+          <a:prstGeom prst="rect">
+            <a:avLst/>
+          </a:prstGeom>
+          <a:noFill/>
+          <a:ln>
+            <a:noFill/>
+          </a:ln>
+        </p:spPr>
+        <p:style>
+          <a:lnRef idx="0"/>
+          <a:fillRef idx="0"/>
+          <a:effectRef idx="0"/>
+          <a:fontRef idx="minor"/>
+        </p:style>
+        <p:txBody>
+          <a:bodyPr lIns="90000" rIns="90000" tIns="45000" bIns="45000">
+            <a:noAutofit/>
+          </a:bodyPr>
+          <a:p>
+            <a:pPr>
+              <a:lnSpc>
+                <a:spcPct val="100000"/>
+              </a:lnSpc>
+            </a:pPr>
+            <a:r>
+              <a:rPr b="0" lang="pt-BR" sz="1800" spc="-1" strike="noStrike">
+                <a:solidFill>
+                  <a:srgbClr val="000000"/>
+                </a:solidFill>
+                <a:latin typeface="Arial"/>
+                <a:ea typeface="DejaVu Sans"/>
+              </a:rPr>
+              <a:t>Max num iterarions 10 50 </a:t>
+            </a:r>
             <a:r>
               <a:rPr b="0" lang="pt-BR" sz="1800" spc="-1" strike="noStrike">
                 <a:solidFill>
@@ -3384,879 +4346,128 @@
           </a:p>
         </p:txBody>
       </p:sp>
-      <p:pic>
-        <p:nvPicPr>
-          <p:cNvPr id="77" name="" descr=""/>
-          <p:cNvPicPr/>
+      <p:grpSp>
+        <p:nvGrpSpPr>
+          <p:cNvPr id="79" name="Group 2"/>
+          <p:cNvGrpSpPr/>
           <p:nvPr/>
-        </p:nvPicPr>
-        <p:blipFill>
-          <a:blip r:embed="rId1"/>
-          <a:stretch/>
-        </p:blipFill>
-        <p:spPr>
-          <a:xfrm>
-            <a:off x="864000" y="720000"/>
-            <a:ext cx="4613040" cy="3359160"/>
-          </a:xfrm>
-          <a:prstGeom prst="rect">
-            <a:avLst/>
-          </a:prstGeom>
-          <a:ln>
-            <a:noFill/>
-          </a:ln>
-        </p:spPr>
-      </p:pic>
-      <p:pic>
-        <p:nvPicPr>
-          <p:cNvPr id="78" name="" descr=""/>
-          <p:cNvPicPr/>
-          <p:nvPr/>
-        </p:nvPicPr>
-        <p:blipFill>
-          <a:blip r:embed="rId2"/>
-          <a:stretch/>
-        </p:blipFill>
-        <p:spPr>
-          <a:xfrm>
-            <a:off x="5477760" y="720000"/>
-            <a:ext cx="4613040" cy="3359160"/>
-          </a:xfrm>
-          <a:prstGeom prst="rect">
-            <a:avLst/>
-          </a:prstGeom>
-          <a:ln>
-            <a:noFill/>
-          </a:ln>
-        </p:spPr>
-      </p:pic>
-      <p:pic>
-        <p:nvPicPr>
-          <p:cNvPr id="79" name="" descr=""/>
-          <p:cNvPicPr/>
-          <p:nvPr/>
-        </p:nvPicPr>
-        <p:blipFill>
-          <a:blip r:embed="rId3"/>
-          <a:stretch/>
-        </p:blipFill>
-        <p:spPr>
-          <a:xfrm>
-            <a:off x="864000" y="4007880"/>
-            <a:ext cx="4613040" cy="3359160"/>
-          </a:xfrm>
-          <a:prstGeom prst="rect">
-            <a:avLst/>
-          </a:prstGeom>
-          <a:ln>
-            <a:noFill/>
-          </a:ln>
-        </p:spPr>
-      </p:pic>
-      <p:pic>
-        <p:nvPicPr>
-          <p:cNvPr id="80" name="" descr=""/>
-          <p:cNvPicPr/>
-          <p:nvPr/>
-        </p:nvPicPr>
-        <p:blipFill>
-          <a:blip r:embed="rId4"/>
-          <a:stretch/>
-        </p:blipFill>
-        <p:spPr>
-          <a:xfrm>
-            <a:off x="5477760" y="3960000"/>
-            <a:ext cx="4613040" cy="3359160"/>
-          </a:xfrm>
-          <a:prstGeom prst="rect">
-            <a:avLst/>
-          </a:prstGeom>
-          <a:ln>
-            <a:noFill/>
-          </a:ln>
-        </p:spPr>
-      </p:pic>
-    </p:spTree>
-  </p:cSld>
-  <mc:AlternateContent>
-    <mc:Choice Requires="p14">
-      <p:transition spd="slow" p14:dur="2000"/>
-    </mc:Choice>
-    <mc:Fallback>
-      <p:transition spd="slow"/>
-    </mc:Fallback>
-  </mc:AlternateContent>
-</p:sld>
-</file>
-
-<file path=ppt/slides/slide10.xml><?xml version="1.0" encoding="utf-8"?>
-<p:sld xmlns:a="http://schemas.openxmlformats.org/drawingml/2006/main" xmlns:p="http://schemas.openxmlformats.org/presentationml/2006/main" xmlns:r="http://schemas.openxmlformats.org/officeDocument/2006/relationships" xmlns:p14="http://schemas.microsoft.com/office/powerpoint/2010/main" xmlns:p15="http://schemas.microsoft.com/office/powerpoint/2012/main" xmlns:mc="http://schemas.openxmlformats.org/markup-compatibility/2006">
-  <p:cSld>
-    <p:spTree>
-      <p:nvGrpSpPr>
-        <p:cNvPr id="1" name=""/>
-        <p:cNvGrpSpPr/>
-        <p:nvPr/>
-      </p:nvGrpSpPr>
-      <p:grpSpPr>
-        <a:xfrm>
-          <a:off x="0" y="0"/>
-          <a:ext cx="0" cy="0"/>
-          <a:chOff x="0" y="0"/>
-          <a:chExt cx="0" cy="0"/>
-        </a:xfrm>
-      </p:grpSpPr>
-      <p:sp>
-        <p:nvSpPr>
-          <p:cNvPr id="119" name="CustomShape 1"/>
-          <p:cNvSpPr/>
-          <p:nvPr/>
-        </p:nvSpPr>
-        <p:spPr>
-          <a:xfrm>
-            <a:off x="138240" y="216000"/>
-            <a:ext cx="1157400" cy="345960"/>
-          </a:xfrm>
-          <a:prstGeom prst="rect">
-            <a:avLst/>
-          </a:prstGeom>
-          <a:noFill/>
-          <a:ln>
-            <a:noFill/>
-          </a:ln>
-        </p:spPr>
-        <p:style>
-          <a:lnRef idx="0"/>
-          <a:fillRef idx="0"/>
-          <a:effectRef idx="0"/>
-          <a:fontRef idx="minor"/>
-        </p:style>
-        <p:txBody>
-          <a:bodyPr lIns="90000" rIns="90000" tIns="45000" bIns="45000">
-            <a:noAutofit/>
-          </a:bodyPr>
-          <a:p>
-            <a:pPr>
-              <a:lnSpc>
-                <a:spcPct val="100000"/>
-              </a:lnSpc>
-            </a:pPr>
-            <a:r>
-              <a:rPr b="0" lang="pt-BR" sz="1800" spc="-1" strike="noStrike">
-                <a:latin typeface="Arial"/>
-              </a:rPr>
-              <a:t>taxacross</a:t>
-            </a:r>
-            <a:endParaRPr b="0" lang="pt-BR" sz="1800" spc="-1" strike="noStrike">
-              <a:latin typeface="Arial"/>
-            </a:endParaRPr>
-          </a:p>
-        </p:txBody>
-      </p:sp>
-      <p:pic>
-        <p:nvPicPr>
-          <p:cNvPr id="120" name="" descr=""/>
-          <p:cNvPicPr/>
-          <p:nvPr/>
-        </p:nvPicPr>
-        <p:blipFill>
-          <a:blip r:embed="rId1"/>
-          <a:stretch/>
-        </p:blipFill>
-        <p:spPr>
-          <a:xfrm>
-            <a:off x="9066240" y="1368000"/>
-            <a:ext cx="4613400" cy="3359520"/>
-          </a:xfrm>
-          <a:prstGeom prst="rect">
-            <a:avLst/>
-          </a:prstGeom>
-          <a:ln>
-            <a:noFill/>
-          </a:ln>
-        </p:spPr>
-      </p:pic>
-      <p:pic>
-        <p:nvPicPr>
-          <p:cNvPr id="121" name="" descr=""/>
-          <p:cNvPicPr/>
-          <p:nvPr/>
-        </p:nvPicPr>
-        <p:blipFill>
-          <a:blip r:embed="rId2"/>
-          <a:stretch/>
-        </p:blipFill>
-        <p:spPr>
-          <a:xfrm>
-            <a:off x="79920" y="1440000"/>
-            <a:ext cx="4599720" cy="3351960"/>
-          </a:xfrm>
-          <a:prstGeom prst="rect">
-            <a:avLst/>
-          </a:prstGeom>
-          <a:ln>
-            <a:noFill/>
-          </a:ln>
-        </p:spPr>
-      </p:pic>
-      <p:pic>
-        <p:nvPicPr>
-          <p:cNvPr id="122" name="" descr=""/>
-          <p:cNvPicPr/>
-          <p:nvPr/>
-        </p:nvPicPr>
-        <p:blipFill>
-          <a:blip r:embed="rId3"/>
-          <a:stretch/>
-        </p:blipFill>
-        <p:spPr>
-          <a:xfrm>
-            <a:off x="4615920" y="1440000"/>
-            <a:ext cx="4599720" cy="3351960"/>
-          </a:xfrm>
-          <a:prstGeom prst="rect">
-            <a:avLst/>
-          </a:prstGeom>
-          <a:ln>
-            <a:noFill/>
-          </a:ln>
-        </p:spPr>
-      </p:pic>
-    </p:spTree>
-  </p:cSld>
-  <mc:AlternateContent>
-    <mc:Choice Requires="p14">
-      <p:transition spd="slow" p14:dur="2000"/>
-    </mc:Choice>
-    <mc:Fallback>
-      <p:transition spd="slow"/>
-    </mc:Fallback>
-  </mc:AlternateContent>
-</p:sld>
-</file>
-
-<file path=ppt/slides/slide11.xml><?xml version="1.0" encoding="utf-8"?>
-<p:sld xmlns:a="http://schemas.openxmlformats.org/drawingml/2006/main" xmlns:p="http://schemas.openxmlformats.org/presentationml/2006/main" xmlns:r="http://schemas.openxmlformats.org/officeDocument/2006/relationships" xmlns:p14="http://schemas.microsoft.com/office/powerpoint/2010/main" xmlns:p15="http://schemas.microsoft.com/office/powerpoint/2012/main" xmlns:mc="http://schemas.openxmlformats.org/markup-compatibility/2006">
-  <p:cSld>
-    <p:spTree>
-      <p:nvGrpSpPr>
-        <p:cNvPr id="1" name=""/>
-        <p:cNvGrpSpPr/>
-        <p:nvPr/>
-      </p:nvGrpSpPr>
-      <p:grpSpPr>
-        <a:xfrm>
-          <a:off x="0" y="0"/>
-          <a:ext cx="0" cy="0"/>
-          <a:chOff x="0" y="0"/>
-          <a:chExt cx="0" cy="0"/>
-        </a:xfrm>
-      </p:grpSpPr>
-      <p:sp>
-        <p:nvSpPr>
-          <p:cNvPr id="123" name="CustomShape 1"/>
-          <p:cNvSpPr/>
-          <p:nvPr/>
-        </p:nvSpPr>
-        <p:spPr>
-          <a:xfrm>
-            <a:off x="138240" y="216000"/>
-            <a:ext cx="1157400" cy="345960"/>
-          </a:xfrm>
-          <a:prstGeom prst="rect">
-            <a:avLst/>
-          </a:prstGeom>
-          <a:noFill/>
-          <a:ln>
-            <a:noFill/>
-          </a:ln>
-        </p:spPr>
-        <p:style>
-          <a:lnRef idx="0"/>
-          <a:fillRef idx="0"/>
-          <a:effectRef idx="0"/>
-          <a:fontRef idx="minor"/>
-        </p:style>
-        <p:txBody>
-          <a:bodyPr lIns="90000" rIns="90000" tIns="45000" bIns="45000">
-            <a:noAutofit/>
-          </a:bodyPr>
-          <a:p>
-            <a:pPr>
-              <a:lnSpc>
-                <a:spcPct val="100000"/>
-              </a:lnSpc>
-            </a:pPr>
-            <a:r>
-              <a:rPr b="0" lang="pt-BR" sz="1800" spc="-1" strike="noStrike">
-                <a:latin typeface="Arial"/>
-              </a:rPr>
-              <a:t>taxacross</a:t>
-            </a:r>
-            <a:endParaRPr b="0" lang="pt-BR" sz="1800" spc="-1" strike="noStrike">
-              <a:latin typeface="Arial"/>
-            </a:endParaRPr>
-          </a:p>
-        </p:txBody>
-      </p:sp>
-      <p:pic>
-        <p:nvPicPr>
-          <p:cNvPr id="124" name="" descr=""/>
-          <p:cNvPicPr/>
-          <p:nvPr/>
-        </p:nvPicPr>
-        <p:blipFill>
-          <a:blip r:embed="rId1"/>
-          <a:stretch/>
-        </p:blipFill>
-        <p:spPr>
-          <a:xfrm>
-            <a:off x="7855920" y="1796400"/>
-            <a:ext cx="4599720" cy="3171240"/>
-          </a:xfrm>
-          <a:prstGeom prst="rect">
-            <a:avLst/>
-          </a:prstGeom>
-          <a:ln>
-            <a:noFill/>
-          </a:ln>
-        </p:spPr>
-      </p:pic>
-      <p:pic>
-        <p:nvPicPr>
-          <p:cNvPr id="125" name="" descr=""/>
-          <p:cNvPicPr/>
-          <p:nvPr/>
-        </p:nvPicPr>
-        <p:blipFill>
-          <a:blip r:embed="rId2"/>
-          <a:stretch/>
-        </p:blipFill>
-        <p:spPr>
-          <a:xfrm>
-            <a:off x="-1576080" y="1887480"/>
-            <a:ext cx="4599720" cy="3152160"/>
-          </a:xfrm>
-          <a:prstGeom prst="rect">
-            <a:avLst/>
-          </a:prstGeom>
-          <a:ln>
-            <a:noFill/>
-          </a:ln>
-        </p:spPr>
-      </p:pic>
-      <p:pic>
-        <p:nvPicPr>
-          <p:cNvPr id="126" name="" descr=""/>
-          <p:cNvPicPr/>
-          <p:nvPr/>
-        </p:nvPicPr>
-        <p:blipFill>
-          <a:blip r:embed="rId3"/>
-          <a:stretch/>
-        </p:blipFill>
-        <p:spPr>
-          <a:xfrm>
-            <a:off x="3168000" y="1872000"/>
-            <a:ext cx="4599720" cy="3190320"/>
-          </a:xfrm>
-          <a:prstGeom prst="rect">
-            <a:avLst/>
-          </a:prstGeom>
-          <a:ln>
-            <a:noFill/>
-          </a:ln>
-        </p:spPr>
-      </p:pic>
-    </p:spTree>
-  </p:cSld>
-  <mc:AlternateContent>
-    <mc:Choice Requires="p14">
-      <p:transition spd="slow" p14:dur="2000"/>
-    </mc:Choice>
-    <mc:Fallback>
-      <p:transition spd="slow"/>
-    </mc:Fallback>
-  </mc:AlternateContent>
-</p:sld>
-</file>
-
-<file path=ppt/slides/slide12.xml><?xml version="1.0" encoding="utf-8"?>
-<p:sld xmlns:a="http://schemas.openxmlformats.org/drawingml/2006/main" xmlns:p="http://schemas.openxmlformats.org/presentationml/2006/main" xmlns:r="http://schemas.openxmlformats.org/officeDocument/2006/relationships" xmlns:p14="http://schemas.microsoft.com/office/powerpoint/2010/main" xmlns:p15="http://schemas.microsoft.com/office/powerpoint/2012/main" xmlns:mc="http://schemas.openxmlformats.org/markup-compatibility/2006">
-  <p:cSld>
-    <p:spTree>
-      <p:nvGrpSpPr>
-        <p:cNvPr id="1" name=""/>
-        <p:cNvGrpSpPr/>
-        <p:nvPr/>
-      </p:nvGrpSpPr>
-      <p:grpSpPr>
-        <a:xfrm>
-          <a:off x="0" y="0"/>
-          <a:ext cx="0" cy="0"/>
-          <a:chOff x="0" y="0"/>
-          <a:chExt cx="0" cy="0"/>
-        </a:xfrm>
-      </p:grpSpPr>
-      <p:sp>
-        <p:nvSpPr>
-          <p:cNvPr id="127" name="TextShape 1"/>
-          <p:cNvSpPr txBox="1"/>
-          <p:nvPr/>
-        </p:nvSpPr>
-        <p:spPr>
-          <a:xfrm>
-            <a:off x="144000" y="157680"/>
-            <a:ext cx="1727640" cy="346320"/>
-          </a:xfrm>
-          <a:prstGeom prst="rect">
-            <a:avLst/>
-          </a:prstGeom>
-          <a:noFill/>
-          <a:ln>
-            <a:noFill/>
-          </a:ln>
-        </p:spPr>
-        <p:txBody>
-          <a:bodyPr lIns="90000" rIns="90000" tIns="45000" bIns="45000">
-            <a:noAutofit/>
-          </a:bodyPr>
-          <a:p>
-            <a:r>
-              <a:rPr b="0" lang="pt-BR" sz="1800" spc="-1" strike="noStrike">
-                <a:latin typeface="Arial"/>
-              </a:rPr>
-              <a:t>Parents portion</a:t>
-            </a:r>
-            <a:endParaRPr b="0" lang="pt-BR" sz="1800" spc="-1" strike="noStrike">
-              <a:latin typeface="Arial"/>
-            </a:endParaRPr>
-          </a:p>
-        </p:txBody>
-      </p:sp>
-      <p:pic>
-        <p:nvPicPr>
-          <p:cNvPr id="128" name="" descr=""/>
-          <p:cNvPicPr/>
-          <p:nvPr/>
-        </p:nvPicPr>
-        <p:blipFill>
-          <a:blip r:embed="rId1"/>
-          <a:stretch/>
-        </p:blipFill>
-        <p:spPr>
-          <a:xfrm>
-            <a:off x="1172160" y="3631680"/>
-            <a:ext cx="4723920" cy="3352320"/>
-          </a:xfrm>
-          <a:prstGeom prst="rect">
-            <a:avLst/>
-          </a:prstGeom>
-          <a:ln>
-            <a:noFill/>
-          </a:ln>
-        </p:spPr>
-      </p:pic>
-      <p:pic>
-        <p:nvPicPr>
-          <p:cNvPr id="129" name="" descr=""/>
-          <p:cNvPicPr/>
-          <p:nvPr/>
-        </p:nvPicPr>
-        <p:blipFill>
-          <a:blip r:embed="rId2"/>
-          <a:stretch/>
-        </p:blipFill>
-        <p:spPr>
-          <a:xfrm>
-            <a:off x="6271920" y="319680"/>
-            <a:ext cx="4600080" cy="3352320"/>
-          </a:xfrm>
-          <a:prstGeom prst="rect">
-            <a:avLst/>
-          </a:prstGeom>
-          <a:ln>
-            <a:noFill/>
-          </a:ln>
-        </p:spPr>
-      </p:pic>
-      <p:pic>
-        <p:nvPicPr>
-          <p:cNvPr id="130" name="" descr=""/>
-          <p:cNvPicPr/>
-          <p:nvPr/>
-        </p:nvPicPr>
-        <p:blipFill>
-          <a:blip r:embed="rId3"/>
-          <a:stretch/>
-        </p:blipFill>
-        <p:spPr>
-          <a:xfrm>
-            <a:off x="1296000" y="319680"/>
-            <a:ext cx="4600080" cy="3352320"/>
-          </a:xfrm>
-          <a:prstGeom prst="rect">
-            <a:avLst/>
-          </a:prstGeom>
-          <a:ln>
-            <a:noFill/>
-          </a:ln>
-        </p:spPr>
-      </p:pic>
-      <p:pic>
-        <p:nvPicPr>
-          <p:cNvPr id="131" name="" descr=""/>
-          <p:cNvPicPr/>
-          <p:nvPr/>
-        </p:nvPicPr>
-        <p:blipFill>
-          <a:blip r:embed="rId4"/>
-          <a:stretch/>
-        </p:blipFill>
-        <p:spPr>
-          <a:xfrm>
-            <a:off x="6271920" y="3559680"/>
-            <a:ext cx="4600080" cy="3352320"/>
-          </a:xfrm>
-          <a:prstGeom prst="rect">
-            <a:avLst/>
-          </a:prstGeom>
-          <a:ln>
-            <a:noFill/>
-          </a:ln>
-        </p:spPr>
-      </p:pic>
-    </p:spTree>
-  </p:cSld>
-  <mc:AlternateContent>
-    <mc:Choice Requires="p14">
-      <p:transition spd="slow" p14:dur="2000"/>
-    </mc:Choice>
-    <mc:Fallback>
-      <p:transition spd="slow"/>
-    </mc:Fallback>
-  </mc:AlternateContent>
-</p:sld>
-</file>
-
-<file path=ppt/slides/slide13.xml><?xml version="1.0" encoding="utf-8"?>
-<p:sld xmlns:a="http://schemas.openxmlformats.org/drawingml/2006/main" xmlns:p="http://schemas.openxmlformats.org/presentationml/2006/main" xmlns:r="http://schemas.openxmlformats.org/officeDocument/2006/relationships" xmlns:p14="http://schemas.microsoft.com/office/powerpoint/2010/main" xmlns:p15="http://schemas.microsoft.com/office/powerpoint/2012/main" xmlns:mc="http://schemas.openxmlformats.org/markup-compatibility/2006">
-  <p:cSld>
-    <p:spTree>
-      <p:nvGrpSpPr>
-        <p:cNvPr id="1" name=""/>
-        <p:cNvGrpSpPr/>
-        <p:nvPr/>
-      </p:nvGrpSpPr>
-      <p:grpSpPr>
-        <a:xfrm>
-          <a:off x="0" y="0"/>
-          <a:ext cx="0" cy="0"/>
-          <a:chOff x="0" y="0"/>
-          <a:chExt cx="0" cy="0"/>
-        </a:xfrm>
-      </p:grpSpPr>
-      <p:sp>
-        <p:nvSpPr>
-          <p:cNvPr id="132" name="TextShape 1"/>
-          <p:cNvSpPr txBox="1"/>
-          <p:nvPr/>
-        </p:nvSpPr>
-        <p:spPr>
-          <a:xfrm>
-            <a:off x="144000" y="157680"/>
-            <a:ext cx="1727640" cy="346320"/>
-          </a:xfrm>
-          <a:prstGeom prst="rect">
-            <a:avLst/>
-          </a:prstGeom>
-          <a:noFill/>
-          <a:ln>
-            <a:noFill/>
-          </a:ln>
-        </p:spPr>
-        <p:txBody>
-          <a:bodyPr lIns="90000" rIns="90000" tIns="45000" bIns="45000">
-            <a:noAutofit/>
-          </a:bodyPr>
-          <a:p>
-            <a:r>
-              <a:rPr b="0" lang="pt-BR" sz="1800" spc="-1" strike="noStrike">
-                <a:latin typeface="Arial"/>
-              </a:rPr>
-              <a:t>Parents portion</a:t>
-            </a:r>
-            <a:endParaRPr b="0" lang="pt-BR" sz="1800" spc="-1" strike="noStrike">
-              <a:latin typeface="Arial"/>
-            </a:endParaRPr>
-          </a:p>
-        </p:txBody>
-      </p:sp>
-      <p:pic>
-        <p:nvPicPr>
-          <p:cNvPr id="133" name="" descr=""/>
-          <p:cNvPicPr/>
-          <p:nvPr/>
-        </p:nvPicPr>
-        <p:blipFill>
-          <a:blip r:embed="rId1"/>
-          <a:stretch/>
-        </p:blipFill>
-        <p:spPr>
-          <a:xfrm>
-            <a:off x="6076080" y="3543480"/>
-            <a:ext cx="4723920" cy="3152520"/>
-          </a:xfrm>
-          <a:prstGeom prst="rect">
-            <a:avLst/>
-          </a:prstGeom>
-          <a:ln>
-            <a:noFill/>
-          </a:ln>
-        </p:spPr>
-      </p:pic>
-      <p:pic>
-        <p:nvPicPr>
-          <p:cNvPr id="134" name="" descr=""/>
-          <p:cNvPicPr/>
-          <p:nvPr/>
-        </p:nvPicPr>
-        <p:blipFill>
-          <a:blip r:embed="rId2"/>
-          <a:stretch/>
-        </p:blipFill>
-        <p:spPr>
-          <a:xfrm>
-            <a:off x="6076080" y="390960"/>
-            <a:ext cx="4600080" cy="3152520"/>
-          </a:xfrm>
-          <a:prstGeom prst="rect">
-            <a:avLst/>
-          </a:prstGeom>
-          <a:ln>
-            <a:noFill/>
-          </a:ln>
-        </p:spPr>
-      </p:pic>
-      <p:pic>
-        <p:nvPicPr>
-          <p:cNvPr id="135" name="" descr=""/>
-          <p:cNvPicPr/>
-          <p:nvPr/>
-        </p:nvPicPr>
-        <p:blipFill>
-          <a:blip r:embed="rId3"/>
-          <a:stretch/>
-        </p:blipFill>
-        <p:spPr>
-          <a:xfrm>
-            <a:off x="1159920" y="360000"/>
-            <a:ext cx="4600080" cy="3152520"/>
-          </a:xfrm>
-          <a:prstGeom prst="rect">
-            <a:avLst/>
-          </a:prstGeom>
-          <a:ln>
-            <a:noFill/>
-          </a:ln>
-        </p:spPr>
-      </p:pic>
-      <p:pic>
-        <p:nvPicPr>
-          <p:cNvPr id="136" name="" descr=""/>
-          <p:cNvPicPr/>
-          <p:nvPr/>
-        </p:nvPicPr>
-        <p:blipFill>
-          <a:blip r:embed="rId4"/>
-          <a:stretch/>
-        </p:blipFill>
-        <p:spPr>
-          <a:xfrm>
-            <a:off x="1296000" y="3615480"/>
-            <a:ext cx="4600080" cy="3152520"/>
-          </a:xfrm>
-          <a:prstGeom prst="rect">
-            <a:avLst/>
-          </a:prstGeom>
-          <a:ln>
-            <a:noFill/>
-          </a:ln>
-        </p:spPr>
-      </p:pic>
-    </p:spTree>
-  </p:cSld>
-  <mc:AlternateContent>
-    <mc:Choice Requires="p14">
-      <p:transition spd="slow" p14:dur="2000"/>
-    </mc:Choice>
-    <mc:Fallback>
-      <p:transition spd="slow"/>
-    </mc:Fallback>
-  </mc:AlternateContent>
-</p:sld>
-</file>
-
-<file path=ppt/slides/slide2.xml><?xml version="1.0" encoding="utf-8"?>
-<p:sld xmlns:a="http://schemas.openxmlformats.org/drawingml/2006/main" xmlns:p="http://schemas.openxmlformats.org/presentationml/2006/main" xmlns:r="http://schemas.openxmlformats.org/officeDocument/2006/relationships" xmlns:p14="http://schemas.microsoft.com/office/powerpoint/2010/main" xmlns:p15="http://schemas.microsoft.com/office/powerpoint/2012/main" xmlns:mc="http://schemas.openxmlformats.org/markup-compatibility/2006">
-  <p:cSld>
-    <p:spTree>
-      <p:nvGrpSpPr>
-        <p:cNvPr id="1" name=""/>
-        <p:cNvGrpSpPr/>
-        <p:nvPr/>
-      </p:nvGrpSpPr>
-      <p:grpSpPr>
-        <a:xfrm>
-          <a:off x="0" y="0"/>
-          <a:ext cx="0" cy="0"/>
-          <a:chOff x="0" y="0"/>
-          <a:chExt cx="0" cy="0"/>
-        </a:xfrm>
-      </p:grpSpPr>
-      <p:sp>
-        <p:nvSpPr>
-          <p:cNvPr id="81" name="CustomShape 1"/>
-          <p:cNvSpPr/>
-          <p:nvPr/>
-        </p:nvSpPr>
-        <p:spPr>
-          <a:xfrm>
-            <a:off x="246240" y="301680"/>
-            <a:ext cx="3641040" cy="345600"/>
-          </a:xfrm>
-          <a:prstGeom prst="rect">
-            <a:avLst/>
-          </a:prstGeom>
-          <a:noFill/>
-          <a:ln>
-            <a:noFill/>
-          </a:ln>
-        </p:spPr>
-        <p:style>
-          <a:lnRef idx="0"/>
-          <a:fillRef idx="0"/>
-          <a:effectRef idx="0"/>
-          <a:fontRef idx="minor"/>
-        </p:style>
-        <p:txBody>
-          <a:bodyPr lIns="90000" rIns="90000" tIns="45000" bIns="45000">
-            <a:noAutofit/>
-          </a:bodyPr>
-          <a:p>
-            <a:pPr>
-              <a:lnSpc>
-                <a:spcPct val="100000"/>
-              </a:lnSpc>
-            </a:pPr>
-            <a:r>
-              <a:rPr b="0" lang="pt-BR" sz="1800" spc="-1" strike="noStrike">
-                <a:solidFill>
-                  <a:srgbClr val="000000"/>
-                </a:solidFill>
-                <a:latin typeface="Arial"/>
-                <a:ea typeface="DejaVu Sans"/>
-              </a:rPr>
-              <a:t>Max num iterarions 10 50 200 500</a:t>
-            </a:r>
-            <a:endParaRPr b="0" lang="pt-BR" sz="1800" spc="-1" strike="noStrike">
-              <a:latin typeface="Arial"/>
-            </a:endParaRPr>
-          </a:p>
-        </p:txBody>
-      </p:sp>
-      <p:pic>
-        <p:nvPicPr>
-          <p:cNvPr id="82" name="" descr=""/>
-          <p:cNvPicPr/>
-          <p:nvPr/>
-        </p:nvPicPr>
-        <p:blipFill>
-          <a:blip r:embed="rId1"/>
-          <a:stretch/>
-        </p:blipFill>
-        <p:spPr>
-          <a:xfrm>
-            <a:off x="132480" y="792000"/>
-            <a:ext cx="4613040" cy="3164760"/>
-          </a:xfrm>
-          <a:prstGeom prst="rect">
-            <a:avLst/>
-          </a:prstGeom>
-          <a:ln>
-            <a:noFill/>
-          </a:ln>
-        </p:spPr>
-      </p:pic>
-      <p:pic>
-        <p:nvPicPr>
-          <p:cNvPr id="83" name="" descr=""/>
-          <p:cNvPicPr/>
-          <p:nvPr/>
-        </p:nvPicPr>
-        <p:blipFill>
-          <a:blip r:embed="rId2"/>
-          <a:stretch/>
-        </p:blipFill>
-        <p:spPr>
-          <a:xfrm>
-            <a:off x="4746240" y="792000"/>
-            <a:ext cx="4613040" cy="3164760"/>
-          </a:xfrm>
-          <a:prstGeom prst="rect">
-            <a:avLst/>
-          </a:prstGeom>
-          <a:ln>
-            <a:noFill/>
-          </a:ln>
-        </p:spPr>
-      </p:pic>
-      <p:pic>
-        <p:nvPicPr>
-          <p:cNvPr id="84" name="" descr=""/>
-          <p:cNvPicPr/>
-          <p:nvPr/>
-        </p:nvPicPr>
-        <p:blipFill>
-          <a:blip r:embed="rId3"/>
-          <a:stretch/>
-        </p:blipFill>
-        <p:spPr>
-          <a:xfrm>
-            <a:off x="72000" y="3962520"/>
-            <a:ext cx="4613040" cy="3164760"/>
-          </a:xfrm>
-          <a:prstGeom prst="rect">
-            <a:avLst/>
-          </a:prstGeom>
-          <a:ln>
-            <a:noFill/>
-          </a:ln>
-        </p:spPr>
-      </p:pic>
-      <p:pic>
-        <p:nvPicPr>
-          <p:cNvPr id="85" name="" descr=""/>
-          <p:cNvPicPr/>
-          <p:nvPr/>
-        </p:nvPicPr>
-        <p:blipFill>
-          <a:blip r:embed="rId4"/>
-          <a:stretch/>
-        </p:blipFill>
-        <p:spPr>
-          <a:xfrm>
-            <a:off x="4818240" y="3888000"/>
-            <a:ext cx="4613040" cy="3164760"/>
-          </a:xfrm>
-          <a:prstGeom prst="rect">
-            <a:avLst/>
-          </a:prstGeom>
-          <a:ln>
-            <a:noFill/>
-          </a:ln>
-        </p:spPr>
-      </p:pic>
+        </p:nvGrpSpPr>
+        <p:grpSpPr>
+          <a:xfrm>
+            <a:off x="863640" y="720000"/>
+            <a:ext cx="9226440" cy="6622920"/>
+            <a:chOff x="863640" y="720000"/>
+            <a:chExt cx="9226440" cy="6622920"/>
+          </a:xfrm>
+        </p:grpSpPr>
+        <p:grpSp>
+          <p:nvGrpSpPr>
+            <p:cNvPr id="80" name="Group 3"/>
+            <p:cNvGrpSpPr/>
+            <p:nvPr/>
+          </p:nvGrpSpPr>
+          <p:grpSpPr>
+            <a:xfrm>
+              <a:off x="863640" y="720000"/>
+              <a:ext cx="9226440" cy="6622920"/>
+              <a:chOff x="863640" y="720000"/>
+              <a:chExt cx="9226440" cy="6622920"/>
+            </a:xfrm>
+          </p:grpSpPr>
+          <p:pic>
+            <p:nvPicPr>
+              <p:cNvPr id="81" name="Imagem 76" descr=""/>
+              <p:cNvPicPr/>
+              <p:nvPr/>
+            </p:nvPicPr>
+            <p:blipFill>
+              <a:blip r:embed="rId1"/>
+              <a:stretch/>
+            </p:blipFill>
+            <p:spPr>
+              <a:xfrm>
+                <a:off x="864000" y="720000"/>
+                <a:ext cx="4612320" cy="3358440"/>
+              </a:xfrm>
+              <a:prstGeom prst="rect">
+                <a:avLst/>
+              </a:prstGeom>
+              <a:ln>
+                <a:noFill/>
+              </a:ln>
+            </p:spPr>
+          </p:pic>
+          <p:pic>
+            <p:nvPicPr>
+              <p:cNvPr id="82" name="Imagem 77" descr=""/>
+              <p:cNvPicPr/>
+              <p:nvPr/>
+            </p:nvPicPr>
+            <p:blipFill>
+              <a:blip r:embed="rId2"/>
+              <a:stretch/>
+            </p:blipFill>
+            <p:spPr>
+              <a:xfrm>
+                <a:off x="5477760" y="720000"/>
+                <a:ext cx="4612320" cy="3358440"/>
+              </a:xfrm>
+              <a:prstGeom prst="rect">
+                <a:avLst/>
+              </a:prstGeom>
+              <a:ln>
+                <a:noFill/>
+              </a:ln>
+            </p:spPr>
+          </p:pic>
+          <p:pic>
+            <p:nvPicPr>
+              <p:cNvPr id="83" name="Imagem 78" descr=""/>
+              <p:cNvPicPr/>
+              <p:nvPr/>
+            </p:nvPicPr>
+            <p:blipFill>
+              <a:blip r:embed="rId3"/>
+              <a:stretch/>
+            </p:blipFill>
+            <p:spPr>
+              <a:xfrm>
+                <a:off x="863640" y="3984480"/>
+                <a:ext cx="4612680" cy="3358440"/>
+              </a:xfrm>
+              <a:prstGeom prst="rect">
+                <a:avLst/>
+              </a:prstGeom>
+              <a:ln>
+                <a:noFill/>
+              </a:ln>
+            </p:spPr>
+          </p:pic>
+          <p:pic>
+            <p:nvPicPr>
+              <p:cNvPr id="84" name="Imagem 79" descr=""/>
+              <p:cNvPicPr/>
+              <p:nvPr/>
+            </p:nvPicPr>
+            <p:blipFill>
+              <a:blip r:embed="rId4"/>
+              <a:stretch/>
+            </p:blipFill>
+            <p:spPr>
+              <a:xfrm>
+                <a:off x="5478480" y="3984480"/>
+                <a:ext cx="4610880" cy="3358440"/>
+              </a:xfrm>
+              <a:prstGeom prst="rect">
+                <a:avLst/>
+              </a:prstGeom>
+              <a:ln>
+                <a:noFill/>
+              </a:ln>
+            </p:spPr>
+          </p:pic>
+        </p:grpSp>
+      </p:grpSp>
     </p:spTree>
   </p:cSld>
   <mc:AlternateContent>
@@ -4289,14 +4500,14 @@
       </p:grpSpPr>
       <p:sp>
         <p:nvSpPr>
-          <p:cNvPr id="86" name="CustomShape 1"/>
+          <p:cNvPr id="85" name="CustomShape 1"/>
           <p:cNvSpPr/>
           <p:nvPr/>
         </p:nvSpPr>
         <p:spPr>
           <a:xfrm>
-            <a:off x="720000" y="432000"/>
-            <a:ext cx="1725480" cy="345600"/>
+            <a:off x="246240" y="301680"/>
+            <a:ext cx="3640320" cy="344880"/>
           </a:xfrm>
           <a:prstGeom prst="rect">
             <a:avLst/>
@@ -4330,7 +4541,7 @@
                 <a:latin typeface="Arial"/>
                 <a:ea typeface="DejaVu Sans"/>
               </a:rPr>
-              <a:t>Population size</a:t>
+              <a:t>Max num iterarions 10 50 200 500</a:t>
             </a:r>
             <a:endParaRPr b="0" lang="pt-BR" sz="1800" spc="-1" strike="noStrike">
               <a:latin typeface="Arial"/>
@@ -4338,98 +4549,113 @@
           </a:p>
         </p:txBody>
       </p:sp>
-      <p:pic>
-        <p:nvPicPr>
-          <p:cNvPr id="87" name="" descr=""/>
-          <p:cNvPicPr/>
+      <p:grpSp>
+        <p:nvGrpSpPr>
+          <p:cNvPr id="86" name="Group 2"/>
+          <p:cNvGrpSpPr/>
           <p:nvPr/>
-        </p:nvPicPr>
-        <p:blipFill>
-          <a:blip r:embed="rId1"/>
-          <a:stretch/>
-        </p:blipFill>
-        <p:spPr>
-          <a:xfrm>
-            <a:off x="288000" y="864000"/>
-            <a:ext cx="4693680" cy="3359160"/>
-          </a:xfrm>
-          <a:prstGeom prst="rect">
-            <a:avLst/>
-          </a:prstGeom>
-          <a:ln>
-            <a:noFill/>
-          </a:ln>
-        </p:spPr>
-      </p:pic>
-      <p:pic>
-        <p:nvPicPr>
-          <p:cNvPr id="88" name="" descr=""/>
-          <p:cNvPicPr/>
-          <p:nvPr/>
-        </p:nvPicPr>
-        <p:blipFill>
-          <a:blip r:embed="rId2"/>
-          <a:stretch/>
-        </p:blipFill>
-        <p:spPr>
-          <a:xfrm>
-            <a:off x="5112000" y="960120"/>
-            <a:ext cx="4613040" cy="3359160"/>
-          </a:xfrm>
-          <a:prstGeom prst="rect">
-            <a:avLst/>
-          </a:prstGeom>
-          <a:ln>
-            <a:noFill/>
-          </a:ln>
-        </p:spPr>
-      </p:pic>
-      <p:pic>
-        <p:nvPicPr>
-          <p:cNvPr id="89" name="" descr=""/>
-          <p:cNvPicPr/>
-          <p:nvPr/>
-        </p:nvPicPr>
-        <p:blipFill>
-          <a:blip r:embed="rId3"/>
-          <a:stretch/>
-        </p:blipFill>
-        <p:spPr>
-          <a:xfrm>
-            <a:off x="377280" y="4320000"/>
-            <a:ext cx="4734000" cy="3359160"/>
-          </a:xfrm>
-          <a:prstGeom prst="rect">
-            <a:avLst/>
-          </a:prstGeom>
-          <a:ln>
-            <a:noFill/>
-          </a:ln>
-        </p:spPr>
-      </p:pic>
-      <p:pic>
-        <p:nvPicPr>
-          <p:cNvPr id="90" name="" descr=""/>
-          <p:cNvPicPr/>
-          <p:nvPr/>
-        </p:nvPicPr>
-        <p:blipFill>
-          <a:blip r:embed="rId4"/>
-          <a:stretch/>
-        </p:blipFill>
-        <p:spPr>
-          <a:xfrm>
-            <a:off x="5273280" y="4416120"/>
-            <a:ext cx="4734000" cy="3359160"/>
-          </a:xfrm>
-          <a:prstGeom prst="rect">
-            <a:avLst/>
-          </a:prstGeom>
-          <a:ln>
-            <a:noFill/>
-          </a:ln>
-        </p:spPr>
-      </p:pic>
+        </p:nvGrpSpPr>
+        <p:grpSpPr>
+          <a:xfrm>
+            <a:off x="101520" y="792000"/>
+            <a:ext cx="9294120" cy="6297120"/>
+            <a:chOff x="101520" y="792000"/>
+            <a:chExt cx="9294120" cy="6297120"/>
+          </a:xfrm>
+        </p:grpSpPr>
+        <p:pic>
+          <p:nvPicPr>
+            <p:cNvPr id="87" name="Imagem 81" descr=""/>
+            <p:cNvPicPr/>
+            <p:nvPr/>
+          </p:nvPicPr>
+          <p:blipFill>
+            <a:blip r:embed="rId1"/>
+            <a:stretch/>
+          </p:blipFill>
+          <p:spPr>
+            <a:xfrm>
+              <a:off x="101520" y="792000"/>
+              <a:ext cx="4614120" cy="3164760"/>
+            </a:xfrm>
+            <a:prstGeom prst="rect">
+              <a:avLst/>
+            </a:prstGeom>
+            <a:ln>
+              <a:noFill/>
+            </a:ln>
+          </p:spPr>
+        </p:pic>
+        <p:pic>
+          <p:nvPicPr>
+            <p:cNvPr id="88" name="Imagem 82" descr=""/>
+            <p:cNvPicPr/>
+            <p:nvPr/>
+          </p:nvPicPr>
+          <p:blipFill>
+            <a:blip r:embed="rId2"/>
+            <a:stretch/>
+          </p:blipFill>
+          <p:spPr>
+            <a:xfrm>
+              <a:off x="4781520" y="792000"/>
+              <a:ext cx="4614120" cy="3164760"/>
+            </a:xfrm>
+            <a:prstGeom prst="rect">
+              <a:avLst/>
+            </a:prstGeom>
+            <a:ln>
+              <a:noFill/>
+            </a:ln>
+          </p:spPr>
+        </p:pic>
+        <p:pic>
+          <p:nvPicPr>
+            <p:cNvPr id="89" name="Imagem 83" descr=""/>
+            <p:cNvPicPr/>
+            <p:nvPr/>
+          </p:nvPicPr>
+          <p:blipFill>
+            <a:blip r:embed="rId3"/>
+            <a:stretch/>
+          </p:blipFill>
+          <p:spPr>
+            <a:xfrm>
+              <a:off x="101520" y="3924360"/>
+              <a:ext cx="4612680" cy="3164760"/>
+            </a:xfrm>
+            <a:prstGeom prst="rect">
+              <a:avLst/>
+            </a:prstGeom>
+            <a:ln>
+              <a:noFill/>
+            </a:ln>
+          </p:spPr>
+        </p:pic>
+        <p:pic>
+          <p:nvPicPr>
+            <p:cNvPr id="90" name="Imagem 84" descr=""/>
+            <p:cNvPicPr/>
+            <p:nvPr/>
+          </p:nvPicPr>
+          <p:blipFill>
+            <a:blip r:embed="rId4"/>
+            <a:stretch/>
+          </p:blipFill>
+          <p:spPr>
+            <a:xfrm>
+              <a:off x="4782960" y="3924360"/>
+              <a:ext cx="4612680" cy="3164760"/>
+            </a:xfrm>
+            <a:prstGeom prst="rect">
+              <a:avLst/>
+            </a:prstGeom>
+            <a:ln>
+              <a:noFill/>
+            </a:ln>
+          </p:spPr>
+        </p:pic>
+      </p:grpSp>
     </p:spTree>
   </p:cSld>
   <mc:AlternateContent>
@@ -4468,8 +4694,8 @@
         </p:nvSpPr>
         <p:spPr>
           <a:xfrm>
-            <a:off x="288000" y="157680"/>
-            <a:ext cx="1725480" cy="345600"/>
+            <a:off x="720000" y="432000"/>
+            <a:ext cx="1724760" cy="344880"/>
           </a:xfrm>
           <a:prstGeom prst="rect">
             <a:avLst/>
@@ -4511,98 +4737,113 @@
           </a:p>
         </p:txBody>
       </p:sp>
-      <p:pic>
-        <p:nvPicPr>
-          <p:cNvPr id="92" name="" descr=""/>
-          <p:cNvPicPr/>
+      <p:grpSp>
+        <p:nvGrpSpPr>
+          <p:cNvPr id="92" name="Group 2"/>
+          <p:cNvGrpSpPr/>
           <p:nvPr/>
-        </p:nvPicPr>
-        <p:blipFill>
-          <a:blip r:embed="rId1"/>
-          <a:stretch/>
-        </p:blipFill>
-        <p:spPr>
-          <a:xfrm>
-            <a:off x="705600" y="578520"/>
-            <a:ext cx="4693680" cy="3164760"/>
-          </a:xfrm>
-          <a:prstGeom prst="rect">
-            <a:avLst/>
-          </a:prstGeom>
-          <a:ln>
-            <a:noFill/>
-          </a:ln>
-        </p:spPr>
-      </p:pic>
-      <p:pic>
-        <p:nvPicPr>
-          <p:cNvPr id="93" name="" descr=""/>
-          <p:cNvPicPr/>
-          <p:nvPr/>
-        </p:nvPicPr>
-        <p:blipFill>
-          <a:blip r:embed="rId2"/>
-          <a:stretch/>
-        </p:blipFill>
-        <p:spPr>
-          <a:xfrm>
-            <a:off x="5616000" y="577440"/>
-            <a:ext cx="4613040" cy="3165840"/>
-          </a:xfrm>
-          <a:prstGeom prst="rect">
-            <a:avLst/>
-          </a:prstGeom>
-          <a:ln>
-            <a:noFill/>
-          </a:ln>
-        </p:spPr>
-      </p:pic>
-      <p:pic>
-        <p:nvPicPr>
-          <p:cNvPr id="94" name="" descr=""/>
-          <p:cNvPicPr/>
-          <p:nvPr/>
-        </p:nvPicPr>
-        <p:blipFill>
-          <a:blip r:embed="rId3"/>
-          <a:stretch/>
-        </p:blipFill>
-        <p:spPr>
-          <a:xfrm>
-            <a:off x="593280" y="3692520"/>
-            <a:ext cx="4734000" cy="3164760"/>
-          </a:xfrm>
-          <a:prstGeom prst="rect">
-            <a:avLst/>
-          </a:prstGeom>
-          <a:ln>
-            <a:noFill/>
-          </a:ln>
-        </p:spPr>
-      </p:pic>
-      <p:pic>
-        <p:nvPicPr>
-          <p:cNvPr id="95" name="" descr=""/>
-          <p:cNvPicPr/>
-          <p:nvPr/>
-        </p:nvPicPr>
-        <p:blipFill>
-          <a:blip r:embed="rId4"/>
-          <a:stretch/>
-        </p:blipFill>
-        <p:spPr>
-          <a:xfrm>
-            <a:off x="5400000" y="3600000"/>
-            <a:ext cx="4734000" cy="3184920"/>
-          </a:xfrm>
-          <a:prstGeom prst="rect">
-            <a:avLst/>
-          </a:prstGeom>
-          <a:ln>
-            <a:noFill/>
-          </a:ln>
-        </p:spPr>
-      </p:pic>
+        </p:nvGrpSpPr>
+        <p:grpSpPr>
+          <a:xfrm>
+            <a:off x="333360" y="911160"/>
+            <a:ext cx="9590760" cy="6816240"/>
+            <a:chOff x="333360" y="911160"/>
+            <a:chExt cx="9590760" cy="6816240"/>
+          </a:xfrm>
+        </p:grpSpPr>
+        <p:pic>
+          <p:nvPicPr>
+            <p:cNvPr id="93" name="Imagem 86" descr=""/>
+            <p:cNvPicPr/>
+            <p:nvPr/>
+          </p:nvPicPr>
+          <p:blipFill>
+            <a:blip r:embed="rId1"/>
+            <a:stretch/>
+          </p:blipFill>
+          <p:spPr>
+            <a:xfrm>
+              <a:off x="333360" y="911160"/>
+              <a:ext cx="4691880" cy="3358440"/>
+            </a:xfrm>
+            <a:prstGeom prst="rect">
+              <a:avLst/>
+            </a:prstGeom>
+            <a:ln>
+              <a:noFill/>
+            </a:ln>
+          </p:spPr>
+        </p:pic>
+        <p:pic>
+          <p:nvPicPr>
+            <p:cNvPr id="94" name="Imagem 87" descr=""/>
+            <p:cNvPicPr/>
+            <p:nvPr/>
+          </p:nvPicPr>
+          <p:blipFill>
+            <a:blip r:embed="rId2"/>
+            <a:stretch/>
+          </p:blipFill>
+          <p:spPr>
+            <a:xfrm>
+              <a:off x="5192640" y="911160"/>
+              <a:ext cx="4614120" cy="3358440"/>
+            </a:xfrm>
+            <a:prstGeom prst="rect">
+              <a:avLst/>
+            </a:prstGeom>
+            <a:ln>
+              <a:noFill/>
+            </a:ln>
+          </p:spPr>
+        </p:pic>
+        <p:pic>
+          <p:nvPicPr>
+            <p:cNvPr id="95" name="Imagem 88" descr=""/>
+            <p:cNvPicPr/>
+            <p:nvPr/>
+          </p:nvPicPr>
+          <p:blipFill>
+            <a:blip r:embed="rId3"/>
+            <a:stretch/>
+          </p:blipFill>
+          <p:spPr>
+            <a:xfrm>
+              <a:off x="333360" y="4368960"/>
+              <a:ext cx="4731480" cy="3358440"/>
+            </a:xfrm>
+            <a:prstGeom prst="rect">
+              <a:avLst/>
+            </a:prstGeom>
+            <a:ln>
+              <a:noFill/>
+            </a:ln>
+          </p:spPr>
+        </p:pic>
+        <p:pic>
+          <p:nvPicPr>
+            <p:cNvPr id="96" name="Imagem 89" descr=""/>
+            <p:cNvPicPr/>
+            <p:nvPr/>
+          </p:nvPicPr>
+          <p:blipFill>
+            <a:blip r:embed="rId4"/>
+            <a:stretch/>
+          </p:blipFill>
+          <p:spPr>
+            <a:xfrm>
+              <a:off x="5192640" y="4368960"/>
+              <a:ext cx="4731480" cy="3358440"/>
+            </a:xfrm>
+            <a:prstGeom prst="rect">
+              <a:avLst/>
+            </a:prstGeom>
+            <a:ln>
+              <a:noFill/>
+            </a:ln>
+          </p:spPr>
+        </p:pic>
+      </p:grpSp>
     </p:spTree>
   </p:cSld>
   <mc:AlternateContent>
@@ -4635,14 +4876,14 @@
       </p:grpSpPr>
       <p:sp>
         <p:nvSpPr>
-          <p:cNvPr id="96" name="CustomShape 1"/>
+          <p:cNvPr id="97" name="CustomShape 1"/>
           <p:cNvSpPr/>
           <p:nvPr/>
         </p:nvSpPr>
         <p:spPr>
           <a:xfrm>
-            <a:off x="144000" y="157680"/>
-            <a:ext cx="1054800" cy="345600"/>
+            <a:off x="288000" y="157680"/>
+            <a:ext cx="1724760" cy="344880"/>
           </a:xfrm>
           <a:prstGeom prst="rect">
             <a:avLst/>
@@ -4676,7 +4917,7 @@
                 <a:latin typeface="Arial"/>
                 <a:ea typeface="DejaVu Sans"/>
               </a:rPr>
-              <a:t>mutacao</a:t>
+              <a:t>Population size</a:t>
             </a:r>
             <a:endParaRPr b="0" lang="pt-BR" sz="1800" spc="-1" strike="noStrike">
               <a:latin typeface="Arial"/>
@@ -4684,98 +4925,113 @@
           </a:p>
         </p:txBody>
       </p:sp>
-      <p:pic>
-        <p:nvPicPr>
-          <p:cNvPr id="97" name="" descr=""/>
-          <p:cNvPicPr/>
+      <p:grpSp>
+        <p:nvGrpSpPr>
+          <p:cNvPr id="98" name="Group 2"/>
+          <p:cNvGrpSpPr/>
           <p:nvPr/>
-        </p:nvPicPr>
-        <p:blipFill>
-          <a:blip r:embed="rId1"/>
-          <a:stretch/>
-        </p:blipFill>
-        <p:spPr>
-          <a:xfrm>
-            <a:off x="6127920" y="3672000"/>
-            <a:ext cx="4599360" cy="3351600"/>
-          </a:xfrm>
-          <a:prstGeom prst="rect">
-            <a:avLst/>
-          </a:prstGeom>
-          <a:ln>
-            <a:noFill/>
-          </a:ln>
-        </p:spPr>
-      </p:pic>
-      <p:pic>
-        <p:nvPicPr>
-          <p:cNvPr id="98" name="" descr=""/>
-          <p:cNvPicPr/>
-          <p:nvPr/>
-        </p:nvPicPr>
-        <p:blipFill>
-          <a:blip r:embed="rId2"/>
-          <a:stretch/>
-        </p:blipFill>
-        <p:spPr>
-          <a:xfrm>
-            <a:off x="1296000" y="288000"/>
-            <a:ext cx="4613040" cy="3359160"/>
-          </a:xfrm>
-          <a:prstGeom prst="rect">
-            <a:avLst/>
-          </a:prstGeom>
-          <a:ln>
-            <a:noFill/>
-          </a:ln>
-        </p:spPr>
-      </p:pic>
-      <p:pic>
-        <p:nvPicPr>
-          <p:cNvPr id="99" name="" descr=""/>
-          <p:cNvPicPr/>
-          <p:nvPr/>
-        </p:nvPicPr>
-        <p:blipFill>
-          <a:blip r:embed="rId3"/>
-          <a:stretch/>
-        </p:blipFill>
-        <p:spPr>
-          <a:xfrm>
-            <a:off x="5911920" y="288000"/>
-            <a:ext cx="4599360" cy="3351600"/>
-          </a:xfrm>
-          <a:prstGeom prst="rect">
-            <a:avLst/>
-          </a:prstGeom>
-          <a:ln>
-            <a:noFill/>
-          </a:ln>
-        </p:spPr>
-      </p:pic>
-      <p:pic>
-        <p:nvPicPr>
-          <p:cNvPr id="100" name="" descr=""/>
-          <p:cNvPicPr/>
-          <p:nvPr/>
-        </p:nvPicPr>
-        <p:blipFill>
-          <a:blip r:embed="rId4"/>
-          <a:stretch/>
-        </p:blipFill>
-        <p:spPr>
-          <a:xfrm>
-            <a:off x="1309680" y="3703680"/>
-            <a:ext cx="4599360" cy="3351600"/>
-          </a:xfrm>
-          <a:prstGeom prst="rect">
-            <a:avLst/>
-          </a:prstGeom>
-          <a:ln>
-            <a:noFill/>
-          </a:ln>
-        </p:spPr>
-      </p:pic>
+        </p:nvGrpSpPr>
+        <p:grpSpPr>
+          <a:xfrm>
+            <a:off x="630360" y="577800"/>
+            <a:ext cx="9535320" cy="6233400"/>
+            <a:chOff x="630360" y="577800"/>
+            <a:chExt cx="9535320" cy="6233400"/>
+          </a:xfrm>
+        </p:grpSpPr>
+        <p:pic>
+          <p:nvPicPr>
+            <p:cNvPr id="99" name="Imagem 91" descr=""/>
+            <p:cNvPicPr/>
+            <p:nvPr/>
+          </p:nvPicPr>
+          <p:blipFill>
+            <a:blip r:embed="rId1"/>
+            <a:stretch/>
+          </p:blipFill>
+          <p:spPr>
+            <a:xfrm>
+              <a:off x="668160" y="577800"/>
+              <a:ext cx="4693680" cy="3164760"/>
+            </a:xfrm>
+            <a:prstGeom prst="rect">
+              <a:avLst/>
+            </a:prstGeom>
+            <a:ln>
+              <a:noFill/>
+            </a:ln>
+          </p:spPr>
+        </p:pic>
+        <p:pic>
+          <p:nvPicPr>
+            <p:cNvPr id="100" name="Imagem 92" descr=""/>
+            <p:cNvPicPr/>
+            <p:nvPr/>
+          </p:nvPicPr>
+          <p:blipFill>
+            <a:blip r:embed="rId2"/>
+            <a:stretch/>
+          </p:blipFill>
+          <p:spPr>
+            <a:xfrm>
+              <a:off x="5554800" y="577800"/>
+              <a:ext cx="4610880" cy="3164760"/>
+            </a:xfrm>
+            <a:prstGeom prst="rect">
+              <a:avLst/>
+            </a:prstGeom>
+            <a:ln>
+              <a:noFill/>
+            </a:ln>
+          </p:spPr>
+        </p:pic>
+        <p:pic>
+          <p:nvPicPr>
+            <p:cNvPr id="101" name="Imagem 93" descr=""/>
+            <p:cNvPicPr/>
+            <p:nvPr/>
+          </p:nvPicPr>
+          <p:blipFill>
+            <a:blip r:embed="rId3"/>
+            <a:stretch/>
+          </p:blipFill>
+          <p:spPr>
+            <a:xfrm>
+              <a:off x="630360" y="3646440"/>
+              <a:ext cx="4731480" cy="3164760"/>
+            </a:xfrm>
+            <a:prstGeom prst="rect">
+              <a:avLst/>
+            </a:prstGeom>
+            <a:ln>
+              <a:noFill/>
+            </a:ln>
+          </p:spPr>
+        </p:pic>
+        <p:pic>
+          <p:nvPicPr>
+            <p:cNvPr id="102" name="Imagem 94" descr=""/>
+            <p:cNvPicPr/>
+            <p:nvPr/>
+          </p:nvPicPr>
+          <p:blipFill>
+            <a:blip r:embed="rId4"/>
+            <a:stretch/>
+          </p:blipFill>
+          <p:spPr>
+            <a:xfrm>
+              <a:off x="5460840" y="3646440"/>
+              <a:ext cx="4704480" cy="3164760"/>
+            </a:xfrm>
+            <a:prstGeom prst="rect">
+              <a:avLst/>
+            </a:prstGeom>
+            <a:ln>
+              <a:noFill/>
+            </a:ln>
+          </p:spPr>
+        </p:pic>
+      </p:grpSp>
     </p:spTree>
   </p:cSld>
   <mc:AlternateContent>
@@ -4808,14 +5064,14 @@
       </p:grpSpPr>
       <p:sp>
         <p:nvSpPr>
-          <p:cNvPr id="101" name="CustomShape 1"/>
+          <p:cNvPr id="103" name="CustomShape 1"/>
           <p:cNvSpPr/>
           <p:nvPr/>
         </p:nvSpPr>
         <p:spPr>
           <a:xfrm>
             <a:off x="144000" y="157680"/>
-            <a:ext cx="1054800" cy="345600"/>
+            <a:ext cx="1054080" cy="344880"/>
           </a:xfrm>
           <a:prstGeom prst="rect">
             <a:avLst/>
@@ -4857,98 +5113,113 @@
           </a:p>
         </p:txBody>
       </p:sp>
-      <p:pic>
-        <p:nvPicPr>
-          <p:cNvPr id="102" name="" descr=""/>
-          <p:cNvPicPr/>
+      <p:grpSp>
+        <p:nvGrpSpPr>
+          <p:cNvPr id="104" name="Group 2"/>
+          <p:cNvGrpSpPr/>
           <p:nvPr/>
-        </p:nvPicPr>
-        <p:blipFill>
-          <a:blip r:embed="rId1"/>
-          <a:stretch/>
-        </p:blipFill>
-        <p:spPr>
-          <a:xfrm>
-            <a:off x="792000" y="3744000"/>
-            <a:ext cx="4599360" cy="3151800"/>
-          </a:xfrm>
-          <a:prstGeom prst="rect">
-            <a:avLst/>
-          </a:prstGeom>
-          <a:ln>
-            <a:noFill/>
-          </a:ln>
-        </p:spPr>
-      </p:pic>
-      <p:pic>
-        <p:nvPicPr>
-          <p:cNvPr id="103" name="" descr=""/>
-          <p:cNvPicPr/>
-          <p:nvPr/>
-        </p:nvPicPr>
-        <p:blipFill>
-          <a:blip r:embed="rId2"/>
-          <a:stretch/>
-        </p:blipFill>
-        <p:spPr>
-          <a:xfrm>
-            <a:off x="864000" y="648000"/>
-            <a:ext cx="4613040" cy="3164760"/>
-          </a:xfrm>
-          <a:prstGeom prst="rect">
-            <a:avLst/>
-          </a:prstGeom>
-          <a:ln>
-            <a:noFill/>
-          </a:ln>
-        </p:spPr>
-      </p:pic>
-      <p:pic>
-        <p:nvPicPr>
-          <p:cNvPr id="104" name="" descr=""/>
-          <p:cNvPicPr/>
-          <p:nvPr/>
-        </p:nvPicPr>
-        <p:blipFill>
-          <a:blip r:embed="rId3"/>
-          <a:stretch/>
-        </p:blipFill>
-        <p:spPr>
-          <a:xfrm>
-            <a:off x="5551920" y="591480"/>
-            <a:ext cx="4599360" cy="3151800"/>
-          </a:xfrm>
-          <a:prstGeom prst="rect">
-            <a:avLst/>
-          </a:prstGeom>
-          <a:ln>
-            <a:noFill/>
-          </a:ln>
-        </p:spPr>
-      </p:pic>
-      <p:pic>
-        <p:nvPicPr>
-          <p:cNvPr id="105" name="" descr=""/>
-          <p:cNvPicPr/>
-          <p:nvPr/>
-        </p:nvPicPr>
-        <p:blipFill>
-          <a:blip r:embed="rId4"/>
-          <a:stretch/>
-        </p:blipFill>
-        <p:spPr>
-          <a:xfrm>
-            <a:off x="5623920" y="3705480"/>
-            <a:ext cx="4599360" cy="3151800"/>
-          </a:xfrm>
-          <a:prstGeom prst="rect">
-            <a:avLst/>
-          </a:prstGeom>
-          <a:ln>
-            <a:noFill/>
-          </a:ln>
-        </p:spPr>
-      </p:pic>
+        </p:nvGrpSpPr>
+        <p:grpSpPr>
+          <a:xfrm>
+            <a:off x="1300320" y="287280"/>
+            <a:ext cx="9317880" cy="6751080"/>
+            <a:chOff x="1300320" y="287280"/>
+            <a:chExt cx="9317880" cy="6751080"/>
+          </a:xfrm>
+        </p:grpSpPr>
+        <p:pic>
+          <p:nvPicPr>
+            <p:cNvPr id="105" name="Imagem 96" descr=""/>
+            <p:cNvPicPr/>
+            <p:nvPr/>
+          </p:nvPicPr>
+          <p:blipFill>
+            <a:blip r:embed="rId1"/>
+            <a:stretch/>
+          </p:blipFill>
+          <p:spPr>
+            <a:xfrm>
+              <a:off x="6019920" y="3687840"/>
+              <a:ext cx="4598280" cy="3350520"/>
+            </a:xfrm>
+            <a:prstGeom prst="rect">
+              <a:avLst/>
+            </a:prstGeom>
+            <a:ln>
+              <a:noFill/>
+            </a:ln>
+          </p:spPr>
+        </p:pic>
+        <p:pic>
+          <p:nvPicPr>
+            <p:cNvPr id="106" name="Imagem 97" descr=""/>
+            <p:cNvPicPr/>
+            <p:nvPr/>
+          </p:nvPicPr>
+          <p:blipFill>
+            <a:blip r:embed="rId2"/>
+            <a:stretch/>
+          </p:blipFill>
+          <p:spPr>
+            <a:xfrm>
+              <a:off x="1300320" y="287280"/>
+              <a:ext cx="4602960" cy="3350520"/>
+            </a:xfrm>
+            <a:prstGeom prst="rect">
+              <a:avLst/>
+            </a:prstGeom>
+            <a:ln>
+              <a:noFill/>
+            </a:ln>
+          </p:spPr>
+        </p:pic>
+        <p:pic>
+          <p:nvPicPr>
+            <p:cNvPr id="107" name="Imagem 98" descr=""/>
+            <p:cNvPicPr/>
+            <p:nvPr/>
+          </p:nvPicPr>
+          <p:blipFill>
+            <a:blip r:embed="rId3"/>
+            <a:stretch/>
+          </p:blipFill>
+          <p:spPr>
+            <a:xfrm>
+              <a:off x="6019920" y="287280"/>
+              <a:ext cx="4596840" cy="3350520"/>
+            </a:xfrm>
+            <a:prstGeom prst="rect">
+              <a:avLst/>
+            </a:prstGeom>
+            <a:ln>
+              <a:noFill/>
+            </a:ln>
+          </p:spPr>
+        </p:pic>
+        <p:pic>
+          <p:nvPicPr>
+            <p:cNvPr id="108" name="Imagem 99" descr=""/>
+            <p:cNvPicPr/>
+            <p:nvPr/>
+          </p:nvPicPr>
+          <p:blipFill>
+            <a:blip r:embed="rId4"/>
+            <a:stretch/>
+          </p:blipFill>
+          <p:spPr>
+            <a:xfrm>
+              <a:off x="1305000" y="3687840"/>
+              <a:ext cx="4598280" cy="3350520"/>
+            </a:xfrm>
+            <a:prstGeom prst="rect">
+              <a:avLst/>
+            </a:prstGeom>
+            <a:ln>
+              <a:noFill/>
+            </a:ln>
+          </p:spPr>
+        </p:pic>
+      </p:grpSp>
     </p:spTree>
   </p:cSld>
   <mc:AlternateContent>
@@ -4981,14 +5252,14 @@
       </p:grpSpPr>
       <p:sp>
         <p:nvSpPr>
-          <p:cNvPr id="106" name="CustomShape 1"/>
+          <p:cNvPr id="109" name="CustomShape 1"/>
           <p:cNvSpPr/>
           <p:nvPr/>
         </p:nvSpPr>
         <p:spPr>
           <a:xfrm>
-            <a:off x="288000" y="288000"/>
-            <a:ext cx="1004760" cy="345960"/>
+            <a:off x="144000" y="157680"/>
+            <a:ext cx="1054080" cy="344880"/>
           </a:xfrm>
           <a:prstGeom prst="rect">
             <a:avLst/>
@@ -5016,9 +5287,13 @@
             </a:pPr>
             <a:r>
               <a:rPr b="0" lang="pt-BR" sz="1800" spc="-1" strike="noStrike">
+                <a:solidFill>
+                  <a:srgbClr val="000000"/>
+                </a:solidFill>
                 <a:latin typeface="Arial"/>
+                <a:ea typeface="DejaVu Sans"/>
               </a:rPr>
-              <a:t>Elit ratio</a:t>
+              <a:t>mutacao</a:t>
             </a:r>
             <a:endParaRPr b="0" lang="pt-BR" sz="1800" spc="-1" strike="noStrike">
               <a:latin typeface="Arial"/>
@@ -5026,75 +5301,113 @@
           </a:p>
         </p:txBody>
       </p:sp>
-      <p:pic>
-        <p:nvPicPr>
-          <p:cNvPr id="107" name="" descr=""/>
-          <p:cNvPicPr/>
+      <p:grpSp>
+        <p:nvGrpSpPr>
+          <p:cNvPr id="110" name="Group 2"/>
+          <p:cNvGrpSpPr/>
           <p:nvPr/>
-        </p:nvPicPr>
-        <p:blipFill>
-          <a:blip r:embed="rId1"/>
-          <a:stretch/>
-        </p:blipFill>
-        <p:spPr>
-          <a:xfrm>
-            <a:off x="-1080000" y="1687680"/>
-            <a:ext cx="4599720" cy="3351960"/>
-          </a:xfrm>
-          <a:prstGeom prst="rect">
-            <a:avLst/>
-          </a:prstGeom>
-          <a:ln>
-            <a:noFill/>
-          </a:ln>
-        </p:spPr>
-      </p:pic>
-      <p:pic>
-        <p:nvPicPr>
-          <p:cNvPr id="108" name="" descr=""/>
-          <p:cNvPicPr/>
-          <p:nvPr/>
-        </p:nvPicPr>
-        <p:blipFill>
-          <a:blip r:embed="rId2"/>
-          <a:stretch/>
-        </p:blipFill>
-        <p:spPr>
-          <a:xfrm>
-            <a:off x="8280000" y="1656000"/>
-            <a:ext cx="4599720" cy="3351960"/>
-          </a:xfrm>
-          <a:prstGeom prst="rect">
-            <a:avLst/>
-          </a:prstGeom>
-          <a:ln>
-            <a:noFill/>
-          </a:ln>
-        </p:spPr>
-      </p:pic>
-      <p:pic>
-        <p:nvPicPr>
-          <p:cNvPr id="109" name="" descr=""/>
-          <p:cNvPicPr/>
-          <p:nvPr/>
-        </p:nvPicPr>
-        <p:blipFill>
-          <a:blip r:embed="rId3"/>
-          <a:stretch/>
-        </p:blipFill>
-        <p:spPr>
-          <a:xfrm>
-            <a:off x="3600000" y="1671840"/>
-            <a:ext cx="4599720" cy="3351960"/>
-          </a:xfrm>
-          <a:prstGeom prst="rect">
-            <a:avLst/>
-          </a:prstGeom>
-          <a:ln>
-            <a:noFill/>
-          </a:ln>
-        </p:spPr>
-      </p:pic>
+        </p:nvGrpSpPr>
+        <p:grpSpPr>
+          <a:xfrm>
+            <a:off x="825480" y="619200"/>
+            <a:ext cx="9362520" cy="6257160"/>
+            <a:chOff x="825480" y="619200"/>
+            <a:chExt cx="9362520" cy="6257160"/>
+          </a:xfrm>
+        </p:grpSpPr>
+        <p:pic>
+          <p:nvPicPr>
+            <p:cNvPr id="111" name="Imagem 101" descr=""/>
+            <p:cNvPicPr/>
+            <p:nvPr/>
+          </p:nvPicPr>
+          <p:blipFill>
+            <a:blip r:embed="rId1"/>
+            <a:stretch/>
+          </p:blipFill>
+          <p:spPr>
+            <a:xfrm>
+              <a:off x="825480" y="3724200"/>
+              <a:ext cx="4598280" cy="3152160"/>
+            </a:xfrm>
+            <a:prstGeom prst="rect">
+              <a:avLst/>
+            </a:prstGeom>
+            <a:ln>
+              <a:noFill/>
+            </a:ln>
+          </p:spPr>
+        </p:pic>
+        <p:pic>
+          <p:nvPicPr>
+            <p:cNvPr id="112" name="Imagem 102" descr=""/>
+            <p:cNvPicPr/>
+            <p:nvPr/>
+          </p:nvPicPr>
+          <p:blipFill>
+            <a:blip r:embed="rId2"/>
+            <a:stretch/>
+          </p:blipFill>
+          <p:spPr>
+            <a:xfrm>
+              <a:off x="830160" y="619200"/>
+              <a:ext cx="4593600" cy="3152160"/>
+            </a:xfrm>
+            <a:prstGeom prst="rect">
+              <a:avLst/>
+            </a:prstGeom>
+            <a:ln>
+              <a:noFill/>
+            </a:ln>
+          </p:spPr>
+        </p:pic>
+        <p:pic>
+          <p:nvPicPr>
+            <p:cNvPr id="113" name="Imagem 103" descr=""/>
+            <p:cNvPicPr/>
+            <p:nvPr/>
+          </p:nvPicPr>
+          <p:blipFill>
+            <a:blip r:embed="rId3"/>
+            <a:stretch/>
+          </p:blipFill>
+          <p:spPr>
+            <a:xfrm>
+              <a:off x="5584680" y="619200"/>
+              <a:ext cx="4602960" cy="3152160"/>
+            </a:xfrm>
+            <a:prstGeom prst="rect">
+              <a:avLst/>
+            </a:prstGeom>
+            <a:ln>
+              <a:noFill/>
+            </a:ln>
+          </p:spPr>
+        </p:pic>
+        <p:pic>
+          <p:nvPicPr>
+            <p:cNvPr id="114" name="Imagem 104" descr=""/>
+            <p:cNvPicPr/>
+            <p:nvPr/>
+          </p:nvPicPr>
+          <p:blipFill>
+            <a:blip r:embed="rId4"/>
+            <a:stretch/>
+          </p:blipFill>
+          <p:spPr>
+            <a:xfrm>
+              <a:off x="5589720" y="3724200"/>
+              <a:ext cx="4598280" cy="3152160"/>
+            </a:xfrm>
+            <a:prstGeom prst="rect">
+              <a:avLst/>
+            </a:prstGeom>
+            <a:ln>
+              <a:noFill/>
+            </a:ln>
+          </p:spPr>
+        </p:pic>
+      </p:grpSp>
     </p:spTree>
   </p:cSld>
   <mc:AlternateContent>
@@ -5127,14 +5440,14 @@
       </p:grpSpPr>
       <p:sp>
         <p:nvSpPr>
-          <p:cNvPr id="110" name="CustomShape 1"/>
+          <p:cNvPr id="115" name="CustomShape 1"/>
           <p:cNvSpPr/>
           <p:nvPr/>
         </p:nvSpPr>
         <p:spPr>
           <a:xfrm>
             <a:off x="288000" y="288000"/>
-            <a:ext cx="1004760" cy="345960"/>
+            <a:ext cx="1004040" cy="345240"/>
           </a:xfrm>
           <a:prstGeom prst="rect">
             <a:avLst/>
@@ -5162,7 +5475,11 @@
             </a:pPr>
             <a:r>
               <a:rPr b="0" lang="pt-BR" sz="1800" spc="-1" strike="noStrike">
+                <a:solidFill>
+                  <a:srgbClr val="000000"/>
+                </a:solidFill>
                 <a:latin typeface="Arial"/>
+                <a:ea typeface="DejaVu Sans"/>
               </a:rPr>
               <a:t>Elit ratio</a:t>
             </a:r>
@@ -5172,75 +5489,90 @@
           </a:p>
         </p:txBody>
       </p:sp>
-      <p:pic>
-        <p:nvPicPr>
-          <p:cNvPr id="111" name="" descr=""/>
-          <p:cNvPicPr/>
+      <p:grpSp>
+        <p:nvGrpSpPr>
+          <p:cNvPr id="116" name="Group 2"/>
+          <p:cNvGrpSpPr/>
           <p:nvPr/>
-        </p:nvPicPr>
-        <p:blipFill>
-          <a:blip r:embed="rId1"/>
-          <a:stretch/>
-        </p:blipFill>
-        <p:spPr>
-          <a:xfrm>
-            <a:off x="9720000" y="1944000"/>
-            <a:ext cx="4599720" cy="3152160"/>
-          </a:xfrm>
-          <a:prstGeom prst="rect">
-            <a:avLst/>
-          </a:prstGeom>
-          <a:ln>
-            <a:noFill/>
-          </a:ln>
-        </p:spPr>
-      </p:pic>
-      <p:pic>
-        <p:nvPicPr>
-          <p:cNvPr id="112" name="" descr=""/>
-          <p:cNvPicPr/>
-          <p:nvPr/>
-        </p:nvPicPr>
-        <p:blipFill>
-          <a:blip r:embed="rId2"/>
-          <a:stretch/>
-        </p:blipFill>
-        <p:spPr>
-          <a:xfrm>
-            <a:off x="367920" y="1915920"/>
-            <a:ext cx="4599720" cy="3152160"/>
-          </a:xfrm>
-          <a:prstGeom prst="rect">
-            <a:avLst/>
-          </a:prstGeom>
-          <a:ln>
-            <a:noFill/>
-          </a:ln>
-        </p:spPr>
-      </p:pic>
-      <p:pic>
-        <p:nvPicPr>
-          <p:cNvPr id="113" name="" descr=""/>
-          <p:cNvPicPr/>
-          <p:nvPr/>
-        </p:nvPicPr>
-        <p:blipFill>
-          <a:blip r:embed="rId3"/>
-          <a:stretch/>
-        </p:blipFill>
-        <p:spPr>
-          <a:xfrm>
-            <a:off x="4968000" y="1887480"/>
-            <a:ext cx="4599720" cy="3152160"/>
-          </a:xfrm>
-          <a:prstGeom prst="rect">
-            <a:avLst/>
-          </a:prstGeom>
-          <a:ln>
-            <a:noFill/>
-          </a:ln>
-        </p:spPr>
-      </p:pic>
+        </p:nvGrpSpPr>
+        <p:grpSpPr>
+          <a:xfrm>
+            <a:off x="-1079640" y="1671480"/>
+            <a:ext cx="13958280" cy="3351960"/>
+            <a:chOff x="-1079640" y="1671480"/>
+            <a:chExt cx="13958280" cy="3351960"/>
+          </a:xfrm>
+        </p:grpSpPr>
+        <p:pic>
+          <p:nvPicPr>
+            <p:cNvPr id="117" name="Imagem 106" descr=""/>
+            <p:cNvPicPr/>
+            <p:nvPr/>
+          </p:nvPicPr>
+          <p:blipFill>
+            <a:blip r:embed="rId1"/>
+            <a:stretch/>
+          </p:blipFill>
+          <p:spPr>
+            <a:xfrm>
+              <a:off x="-1079640" y="1671480"/>
+              <a:ext cx="4598280" cy="3351960"/>
+            </a:xfrm>
+            <a:prstGeom prst="rect">
+              <a:avLst/>
+            </a:prstGeom>
+            <a:ln>
+              <a:noFill/>
+            </a:ln>
+          </p:spPr>
+        </p:pic>
+        <p:pic>
+          <p:nvPicPr>
+            <p:cNvPr id="118" name="Imagem 107" descr=""/>
+            <p:cNvPicPr/>
+            <p:nvPr/>
+          </p:nvPicPr>
+          <p:blipFill>
+            <a:blip r:embed="rId2"/>
+            <a:stretch/>
+          </p:blipFill>
+          <p:spPr>
+            <a:xfrm>
+              <a:off x="8280360" y="1671480"/>
+              <a:ext cx="4598280" cy="3351960"/>
+            </a:xfrm>
+            <a:prstGeom prst="rect">
+              <a:avLst/>
+            </a:prstGeom>
+            <a:ln>
+              <a:noFill/>
+            </a:ln>
+          </p:spPr>
+        </p:pic>
+        <p:pic>
+          <p:nvPicPr>
+            <p:cNvPr id="119" name="Imagem 108" descr=""/>
+            <p:cNvPicPr/>
+            <p:nvPr/>
+          </p:nvPicPr>
+          <p:blipFill>
+            <a:blip r:embed="rId3"/>
+            <a:stretch/>
+          </p:blipFill>
+          <p:spPr>
+            <a:xfrm>
+              <a:off x="3600000" y="1671840"/>
+              <a:ext cx="4599000" cy="3351240"/>
+            </a:xfrm>
+            <a:prstGeom prst="rect">
+              <a:avLst/>
+            </a:prstGeom>
+            <a:ln>
+              <a:noFill/>
+            </a:ln>
+          </p:spPr>
+        </p:pic>
+      </p:grpSp>
     </p:spTree>
   </p:cSld>
   <mc:AlternateContent>
@@ -5273,14 +5605,14 @@
       </p:grpSpPr>
       <p:sp>
         <p:nvSpPr>
-          <p:cNvPr id="114" name="CustomShape 1"/>
+          <p:cNvPr id="120" name="CustomShape 1"/>
           <p:cNvSpPr/>
           <p:nvPr/>
         </p:nvSpPr>
         <p:spPr>
           <a:xfrm>
-            <a:off x="288000" y="216000"/>
-            <a:ext cx="1224360" cy="345960"/>
+            <a:off x="288000" y="288000"/>
+            <a:ext cx="1004040" cy="345240"/>
           </a:xfrm>
           <a:prstGeom prst="rect">
             <a:avLst/>
@@ -5308,9 +5640,13 @@
             </a:pPr>
             <a:r>
               <a:rPr b="0" lang="pt-BR" sz="1800" spc="-1" strike="noStrike">
+                <a:solidFill>
+                  <a:srgbClr val="000000"/>
+                </a:solidFill>
                 <a:latin typeface="Arial"/>
+                <a:ea typeface="DejaVu Sans"/>
               </a:rPr>
-              <a:t>Tipo cross</a:t>
+              <a:t>Elit ratio</a:t>
             </a:r>
             <a:endParaRPr b="0" lang="pt-BR" sz="1800" spc="-1" strike="noStrike">
               <a:latin typeface="Arial"/>
@@ -5318,98 +5654,90 @@
           </a:p>
         </p:txBody>
       </p:sp>
-      <p:pic>
-        <p:nvPicPr>
-          <p:cNvPr id="115" name="" descr=""/>
-          <p:cNvPicPr/>
+      <p:grpSp>
+        <p:nvGrpSpPr>
+          <p:cNvPr id="121" name="Group 2"/>
+          <p:cNvGrpSpPr/>
           <p:nvPr/>
-        </p:nvPicPr>
-        <p:blipFill>
-          <a:blip r:embed="rId1"/>
-          <a:stretch/>
-        </p:blipFill>
-        <p:spPr>
-          <a:xfrm>
-            <a:off x="1951920" y="247680"/>
-            <a:ext cx="4599720" cy="3351960"/>
-          </a:xfrm>
-          <a:prstGeom prst="rect">
-            <a:avLst/>
-          </a:prstGeom>
-          <a:ln>
-            <a:noFill/>
-          </a:ln>
-        </p:spPr>
-      </p:pic>
-      <p:pic>
-        <p:nvPicPr>
-          <p:cNvPr id="116" name="" descr=""/>
-          <p:cNvPicPr/>
-          <p:nvPr/>
-        </p:nvPicPr>
-        <p:blipFill>
-          <a:blip r:embed="rId2"/>
-          <a:stretch/>
-        </p:blipFill>
-        <p:spPr>
-          <a:xfrm>
-            <a:off x="6652080" y="216000"/>
-            <a:ext cx="4723560" cy="3351960"/>
-          </a:xfrm>
-          <a:prstGeom prst="rect">
-            <a:avLst/>
-          </a:prstGeom>
-          <a:ln>
-            <a:noFill/>
-          </a:ln>
-        </p:spPr>
-      </p:pic>
-      <p:pic>
-        <p:nvPicPr>
-          <p:cNvPr id="117" name="" descr=""/>
-          <p:cNvPicPr/>
-          <p:nvPr/>
-        </p:nvPicPr>
-        <p:blipFill>
-          <a:blip r:embed="rId3"/>
-          <a:stretch/>
-        </p:blipFill>
-        <p:spPr>
-          <a:xfrm>
-            <a:off x="2160000" y="3399480"/>
-            <a:ext cx="4599720" cy="3152160"/>
-          </a:xfrm>
-          <a:prstGeom prst="rect">
-            <a:avLst/>
-          </a:prstGeom>
-          <a:ln>
-            <a:noFill/>
-          </a:ln>
-        </p:spPr>
-      </p:pic>
-      <p:pic>
-        <p:nvPicPr>
-          <p:cNvPr id="118" name="" descr=""/>
-          <p:cNvPicPr/>
-          <p:nvPr/>
-        </p:nvPicPr>
-        <p:blipFill>
-          <a:blip r:embed="rId4"/>
-          <a:stretch/>
-        </p:blipFill>
-        <p:spPr>
-          <a:xfrm>
-            <a:off x="6624000" y="3471480"/>
-            <a:ext cx="4723560" cy="3152160"/>
-          </a:xfrm>
-          <a:prstGeom prst="rect">
-            <a:avLst/>
-          </a:prstGeom>
-          <a:ln>
-            <a:noFill/>
-          </a:ln>
-        </p:spPr>
-      </p:pic>
+        </p:nvGrpSpPr>
+        <p:grpSpPr>
+          <a:xfrm>
+            <a:off x="439920" y="1915920"/>
+            <a:ext cx="13878720" cy="3151440"/>
+            <a:chOff x="439920" y="1915920"/>
+            <a:chExt cx="13878720" cy="3151440"/>
+          </a:xfrm>
+        </p:grpSpPr>
+        <p:pic>
+          <p:nvPicPr>
+            <p:cNvPr id="122" name="Imagem 110" descr=""/>
+            <p:cNvPicPr/>
+            <p:nvPr/>
+          </p:nvPicPr>
+          <p:blipFill>
+            <a:blip r:embed="rId1"/>
+            <a:stretch/>
+          </p:blipFill>
+          <p:spPr>
+            <a:xfrm>
+              <a:off x="9720360" y="1916280"/>
+              <a:ext cx="4598280" cy="3150360"/>
+            </a:xfrm>
+            <a:prstGeom prst="rect">
+              <a:avLst/>
+            </a:prstGeom>
+            <a:ln>
+              <a:noFill/>
+            </a:ln>
+          </p:spPr>
+        </p:pic>
+        <p:pic>
+          <p:nvPicPr>
+            <p:cNvPr id="123" name="Imagem 111" descr=""/>
+            <p:cNvPicPr/>
+            <p:nvPr/>
+          </p:nvPicPr>
+          <p:blipFill>
+            <a:blip r:embed="rId2"/>
+            <a:stretch/>
+          </p:blipFill>
+          <p:spPr>
+            <a:xfrm>
+              <a:off x="439920" y="1915920"/>
+              <a:ext cx="4599000" cy="3151440"/>
+            </a:xfrm>
+            <a:prstGeom prst="rect">
+              <a:avLst/>
+            </a:prstGeom>
+            <a:ln>
+              <a:noFill/>
+            </a:ln>
+          </p:spPr>
+        </p:pic>
+        <p:pic>
+          <p:nvPicPr>
+            <p:cNvPr id="124" name="Imagem 112" descr=""/>
+            <p:cNvPicPr/>
+            <p:nvPr/>
+          </p:nvPicPr>
+          <p:blipFill>
+            <a:blip r:embed="rId3"/>
+            <a:stretch/>
+          </p:blipFill>
+          <p:spPr>
+            <a:xfrm>
+              <a:off x="5081760" y="1916280"/>
+              <a:ext cx="4596840" cy="3150360"/>
+            </a:xfrm>
+            <a:prstGeom prst="rect">
+              <a:avLst/>
+            </a:prstGeom>
+            <a:ln>
+              <a:noFill/>
+            </a:ln>
+          </p:spPr>
+        </p:pic>
+      </p:grpSp>
     </p:spTree>
   </p:cSld>
   <mc:AlternateContent>

</xml_diff>